<commit_message>
Added description of the JSRobot API
</commit_message>
<xml_diff>
--- a/doc/Computer Programming 1.pptx
+++ b/doc/Computer Programming 1.pptx
@@ -5,7 +5,7 @@
     <p:sldMasterId id="2147483648" r:id="rId1"/>
   </p:sldMasterIdLst>
   <p:notesMasterIdLst>
-    <p:notesMasterId r:id="rId23"/>
+    <p:notesMasterId r:id="rId32"/>
   </p:notesMasterIdLst>
   <p:sldIdLst>
     <p:sldId id="256" r:id="rId2"/>
@@ -29,6 +29,15 @@
     <p:sldId id="272" r:id="rId20"/>
     <p:sldId id="273" r:id="rId21"/>
     <p:sldId id="274" r:id="rId22"/>
+    <p:sldId id="279" r:id="rId23"/>
+    <p:sldId id="278" r:id="rId24"/>
+    <p:sldId id="280" r:id="rId25"/>
+    <p:sldId id="281" r:id="rId26"/>
+    <p:sldId id="282" r:id="rId27"/>
+    <p:sldId id="283" r:id="rId28"/>
+    <p:sldId id="284" r:id="rId29"/>
+    <p:sldId id="285" r:id="rId30"/>
+    <p:sldId id="286" r:id="rId31"/>
   </p:sldIdLst>
   <p:sldSz cx="9144000" cy="6858000" type="screen4x3"/>
   <p:notesSz cx="6858000" cy="9144000"/>
@@ -129,7 +138,7 @@
   </p:defaultTextStyle>
   <p:extLst>
     <p:ext uri="{EFAFB233-063F-42B5-8137-9DF3F51BA10A}">
-      <p15:sldGuideLst xmlns:p15="http://schemas.microsoft.com/office/powerpoint/2012/main">
+      <p15:sldGuideLst xmlns:p15="http://schemas.microsoft.com/office/powerpoint/2012/main" xmlns="">
         <p15:guide id="1" orient="horz" pos="2160">
           <p15:clr>
             <a:srgbClr val="A4A3A4"/>
@@ -228,7 +237,7 @@
           <a:p>
             <a:fld id="{AC3BB2AB-7E53-4444-A9AA-484976F48190}" type="datetimeFigureOut">
               <a:rPr lang="en-US" smtClean="0"/>
-              <a:t>9/18/2015</a:t>
+              <a:t>9/20/2015</a:t>
             </a:fld>
             <a:endParaRPr lang="en-US"/>
           </a:p>
@@ -933,7 +942,7 @@
           <a:p>
             <a:fld id="{E48118A4-110A-4925-9333-BC5A7FDABDA6}" type="datetime1">
               <a:rPr lang="en-US" smtClean="0"/>
-              <a:t>9/18/2015</a:t>
+              <a:t>9/20/2015</a:t>
             </a:fld>
             <a:endParaRPr lang="en-US"/>
           </a:p>
@@ -1168,7 +1177,7 @@
           <a:p>
             <a:fld id="{0A2E4327-6481-4226-A82C-E682EA4A35CC}" type="datetime1">
               <a:rPr lang="en-US" smtClean="0"/>
-              <a:t>9/18/2015</a:t>
+              <a:t>9/20/2015</a:t>
             </a:fld>
             <a:endParaRPr lang="en-US"/>
           </a:p>
@@ -1359,7 +1368,7 @@
           <a:p>
             <a:fld id="{E2D702B0-E00D-4C98-9C46-5C4CB5F093B0}" type="datetime1">
               <a:rPr lang="en-US" smtClean="0"/>
-              <a:t>9/18/2015</a:t>
+              <a:t>9/20/2015</a:t>
             </a:fld>
             <a:endParaRPr lang="en-US"/>
           </a:p>
@@ -1553,7 +1562,7 @@
           <a:p>
             <a:fld id="{1CC94077-FDE3-401A-BCD8-35C08F9C8E9C}" type="datetime1">
               <a:rPr lang="en-US" smtClean="0"/>
-              <a:t>9/18/2015</a:t>
+              <a:t>9/20/2015</a:t>
             </a:fld>
             <a:endParaRPr lang="en-US"/>
           </a:p>
@@ -1810,7 +1819,7 @@
           <a:p>
             <a:fld id="{1B40FCA3-EDB1-48B8-86CC-B4143E849120}" type="datetime1">
               <a:rPr lang="en-US" smtClean="0"/>
-              <a:t>9/18/2015</a:t>
+              <a:t>9/20/2015</a:t>
             </a:fld>
             <a:endParaRPr lang="en-US"/>
           </a:p>
@@ -2109,7 +2118,7 @@
           <a:p>
             <a:fld id="{D349E218-273A-4075-9C9D-22197EABA91B}" type="datetime1">
               <a:rPr lang="en-US" smtClean="0"/>
-              <a:t>9/18/2015</a:t>
+              <a:t>9/20/2015</a:t>
             </a:fld>
             <a:endParaRPr lang="en-US"/>
           </a:p>
@@ -2542,7 +2551,7 @@
           <a:p>
             <a:fld id="{B8B20B94-8863-4C11-BD5B-99AFE2590A93}" type="datetime1">
               <a:rPr lang="en-US" smtClean="0"/>
-              <a:t>9/18/2015</a:t>
+              <a:t>9/20/2015</a:t>
             </a:fld>
             <a:endParaRPr lang="en-US"/>
           </a:p>
@@ -2671,7 +2680,7 @@
           <a:p>
             <a:fld id="{3982EF56-2C12-43BA-B511-8155CE4B5F26}" type="datetime1">
               <a:rPr lang="en-US" smtClean="0"/>
-              <a:t>9/18/2015</a:t>
+              <a:t>9/20/2015</a:t>
             </a:fld>
             <a:endParaRPr lang="en-US"/>
           </a:p>
@@ -2777,7 +2786,7 @@
           <a:p>
             <a:fld id="{67B73BE6-683B-480E-BD58-7F6BEA0B7BD5}" type="datetime1">
               <a:rPr lang="en-US" smtClean="0"/>
-              <a:t>9/18/2015</a:t>
+              <a:t>9/20/2015</a:t>
             </a:fld>
             <a:endParaRPr lang="en-US"/>
           </a:p>
@@ -3065,7 +3074,7 @@
           <a:p>
             <a:fld id="{45AD249F-C4CE-406B-B40A-9F02EDC68302}" type="datetime1">
               <a:rPr lang="en-US" smtClean="0"/>
-              <a:t>9/18/2015</a:t>
+              <a:t>9/20/2015</a:t>
             </a:fld>
             <a:endParaRPr lang="en-US"/>
           </a:p>
@@ -3329,7 +3338,7 @@
           <a:p>
             <a:fld id="{D56D8053-4F23-4744-B7EF-88442188BCEC}" type="datetime1">
               <a:rPr lang="en-US" smtClean="0"/>
-              <a:t>9/18/2015</a:t>
+              <a:t>9/20/2015</a:t>
             </a:fld>
             <a:endParaRPr lang="en-US"/>
           </a:p>
@@ -3553,7 +3562,7 @@
           <a:p>
             <a:fld id="{64B11703-DF0D-4969-ACC9-C9FEC18DE100}" type="datetime1">
               <a:rPr lang="en-US" smtClean="0"/>
-              <a:t>9/18/2015</a:t>
+              <a:t>9/20/2015</a:t>
             </a:fld>
             <a:endParaRPr lang="en-US"/>
           </a:p>
@@ -4109,7 +4118,7 @@
           <a:p>
             <a:fld id="{3C881C21-AB30-4CB8-B358-F525BEAB214D}" type="datetime1">
               <a:rPr lang="en-US" smtClean="0"/>
-              <a:t>9/18/2015</a:t>
+              <a:t>9/20/2015</a:t>
             </a:fld>
             <a:endParaRPr lang="en-US"/>
           </a:p>
@@ -4395,7 +4404,7 @@
           <a:p>
             <a:fld id="{FDAA5173-8692-49D9-B287-93D52240196C}" type="datetime1">
               <a:rPr lang="en-US" smtClean="0"/>
-              <a:t>9/18/2015</a:t>
+              <a:t>9/20/2015</a:t>
             </a:fld>
             <a:endParaRPr lang="en-US"/>
           </a:p>
@@ -4696,7 +4705,7 @@
           <a:p>
             <a:fld id="{24B64F5A-C452-4B2C-A2B8-1DD3D2201569}" type="datetime1">
               <a:rPr lang="en-US" smtClean="0"/>
-              <a:t>9/18/2015</a:t>
+              <a:t>9/20/2015</a:t>
             </a:fld>
             <a:endParaRPr lang="en-US"/>
           </a:p>
@@ -5084,7 +5093,7 @@
           <a:p>
             <a:fld id="{E6687B95-F2AA-43BE-A1DF-C9C496EF8DD3}" type="datetime1">
               <a:rPr lang="en-US" smtClean="0"/>
-              <a:t>9/18/2015</a:t>
+              <a:t>9/20/2015</a:t>
             </a:fld>
             <a:endParaRPr lang="en-US"/>
           </a:p>
@@ -5484,7 +5493,7 @@
           <a:p>
             <a:fld id="{046F1FCF-F06B-4D07-A3E4-75BF796AD2D8}" type="datetime1">
               <a:rPr lang="en-US" smtClean="0"/>
-              <a:t>9/18/2015</a:t>
+              <a:t>9/20/2015</a:t>
             </a:fld>
             <a:endParaRPr lang="en-US"/>
           </a:p>
@@ -5726,7 +5735,7 @@
           <a:p>
             <a:fld id="{CCE2C4C2-3D09-49AC-B2B9-F32567B8319A}" type="datetime1">
               <a:rPr lang="en-US" smtClean="0"/>
-              <a:t>9/18/2015</a:t>
+              <a:t>9/20/2015</a:t>
             </a:fld>
             <a:endParaRPr lang="en-US"/>
           </a:p>
@@ -5981,7 +5990,7 @@
           <a:p>
             <a:fld id="{1CC94077-FDE3-401A-BCD8-35C08F9C8E9C}" type="datetime1">
               <a:rPr lang="en-US" smtClean="0"/>
-              <a:t>9/18/2015</a:t>
+              <a:t>9/20/2015</a:t>
             </a:fld>
             <a:endParaRPr lang="en-US" dirty="0"/>
           </a:p>
@@ -6241,7 +6250,7 @@
           <a:p>
             <a:fld id="{1CC94077-FDE3-401A-BCD8-35C08F9C8E9C}" type="datetime1">
               <a:rPr lang="en-US" smtClean="0"/>
-              <a:t>9/18/2015</a:t>
+              <a:t>9/20/2015</a:t>
             </a:fld>
             <a:endParaRPr lang="en-US"/>
           </a:p>
@@ -6556,7 +6565,7 @@
           <a:p>
             <a:fld id="{1CC94077-FDE3-401A-BCD8-35C08F9C8E9C}" type="datetime1">
               <a:rPr lang="en-US" smtClean="0"/>
-              <a:t>9/18/2015</a:t>
+              <a:t>9/20/2015</a:t>
             </a:fld>
             <a:endParaRPr lang="en-US"/>
           </a:p>
@@ -6865,7 +6874,7 @@
           <a:p>
             <a:fld id="{1CC94077-FDE3-401A-BCD8-35C08F9C8E9C}" type="datetime1">
               <a:rPr lang="en-US" smtClean="0"/>
-              <a:t>9/18/2015</a:t>
+              <a:t>9/20/2015</a:t>
             </a:fld>
             <a:endParaRPr lang="en-US"/>
           </a:p>
@@ -7318,7 +7327,7 @@
           <a:p>
             <a:fld id="{1CC94077-FDE3-401A-BCD8-35C08F9C8E9C}" type="datetime1">
               <a:rPr lang="en-US" smtClean="0"/>
-              <a:t>9/18/2015</a:t>
+              <a:t>9/20/2015</a:t>
             </a:fld>
             <a:endParaRPr lang="en-US"/>
           </a:p>
@@ -7603,7 +7612,7 @@
           <a:p>
             <a:fld id="{B8B20B94-8863-4C11-BD5B-99AFE2590A93}" type="datetime1">
               <a:rPr lang="en-US" smtClean="0"/>
-              <a:t>9/18/2015</a:t>
+              <a:t>9/20/2015</a:t>
             </a:fld>
             <a:endParaRPr lang="en-US"/>
           </a:p>
@@ -7704,11 +7713,11 @@
   <p:clrMapOvr>
     <a:masterClrMapping/>
   </p:clrMapOvr>
-  <mc:AlternateContent xmlns:mc="http://schemas.openxmlformats.org/markup-compatibility/2006">
-    <mc:Choice xmlns:p14="http://schemas.microsoft.com/office/powerpoint/2010/main" Requires="p14">
+  <mc:AlternateContent xmlns:mc="http://schemas.openxmlformats.org/markup-compatibility/2006" xmlns:p14="http://schemas.microsoft.com/office/powerpoint/2010/main">
+    <mc:Choice Requires="p14">
       <p:transition p14:dur="0"/>
     </mc:Choice>
-    <mc:Fallback>
+    <mc:Fallback xmlns="">
       <p:transition/>
     </mc:Fallback>
   </mc:AlternateContent>
@@ -7936,7 +7945,7 @@
           <a:p>
             <a:fld id="{1CC94077-FDE3-401A-BCD8-35C08F9C8E9C}" type="datetime1">
               <a:rPr lang="en-US" smtClean="0"/>
-              <a:t>9/18/2015</a:t>
+              <a:t>9/20/2015</a:t>
             </a:fld>
             <a:endParaRPr lang="en-US"/>
           </a:p>
@@ -8084,7 +8093,7 @@
           <a:p>
             <a:fld id="{1CC94077-FDE3-401A-BCD8-35C08F9C8E9C}" type="datetime1">
               <a:rPr lang="en-US" smtClean="0"/>
-              <a:t>9/18/2015</a:t>
+              <a:t>9/20/2015</a:t>
             </a:fld>
             <a:endParaRPr lang="en-US"/>
           </a:p>
@@ -8156,6 +8165,2149 @@
 </p:sld>
 </file>
 
+<file path=ppt/slides/slide22.xml><?xml version="1.0" encoding="utf-8"?>
+<p:sld xmlns:a="http://schemas.openxmlformats.org/drawingml/2006/main" xmlns:r="http://schemas.openxmlformats.org/officeDocument/2006/relationships" xmlns:p="http://schemas.openxmlformats.org/presentationml/2006/main">
+  <p:cSld>
+    <p:spTree>
+      <p:nvGrpSpPr>
+        <p:cNvPr id="1" name=""/>
+        <p:cNvGrpSpPr/>
+        <p:nvPr/>
+      </p:nvGrpSpPr>
+      <p:grpSpPr>
+        <a:xfrm>
+          <a:off x="0" y="0"/>
+          <a:ext cx="0" cy="0"/>
+          <a:chOff x="0" y="0"/>
+          <a:chExt cx="0" cy="0"/>
+        </a:xfrm>
+      </p:grpSpPr>
+      <p:sp>
+        <p:nvSpPr>
+          <p:cNvPr id="2" name="Title 1"/>
+          <p:cNvSpPr>
+            <a:spLocks noGrp="1"/>
+          </p:cNvSpPr>
+          <p:nvPr>
+            <p:ph type="title"/>
+          </p:nvPr>
+        </p:nvSpPr>
+        <p:spPr/>
+        <p:txBody>
+          <a:bodyPr/>
+          <a:lstStyle/>
+          <a:p>
+            <a:r>
+              <a:rPr lang="en-US" dirty="0" smtClean="0"/>
+              <a:t>Load event</a:t>
+            </a:r>
+            <a:endParaRPr lang="en-US" dirty="0"/>
+          </a:p>
+        </p:txBody>
+      </p:sp>
+      <p:sp>
+        <p:nvSpPr>
+          <p:cNvPr id="3" name="Content Placeholder 2"/>
+          <p:cNvSpPr>
+            <a:spLocks noGrp="1"/>
+          </p:cNvSpPr>
+          <p:nvPr>
+            <p:ph idx="1"/>
+          </p:nvPr>
+        </p:nvSpPr>
+        <p:spPr/>
+        <p:txBody>
+          <a:bodyPr/>
+          <a:lstStyle/>
+          <a:p>
+            <a:pPr marL="0" indent="0">
+              <a:buNone/>
+            </a:pPr>
+            <a:r>
+              <a:rPr lang="en-US" dirty="0" err="1">
+                <a:solidFill>
+                  <a:schemeClr val="accent3"/>
+                </a:solidFill>
+              </a:rPr>
+              <a:t>window.addEventListener</a:t>
+            </a:r>
+            <a:r>
+              <a:rPr lang="en-US" dirty="0">
+                <a:solidFill>
+                  <a:schemeClr val="accent3"/>
+                </a:solidFill>
+              </a:rPr>
+              <a:t>("load", function() </a:t>
+            </a:r>
+            <a:r>
+              <a:rPr lang="en-US" dirty="0" smtClean="0">
+                <a:solidFill>
+                  <a:schemeClr val="accent3"/>
+                </a:solidFill>
+              </a:rPr>
+              <a:t>{</a:t>
+            </a:r>
+          </a:p>
+          <a:p>
+            <a:pPr marL="0" indent="0">
+              <a:buNone/>
+            </a:pPr>
+            <a:r>
+              <a:rPr lang="en-US" dirty="0" smtClean="0">
+                <a:solidFill>
+                  <a:schemeClr val="accent3"/>
+                </a:solidFill>
+              </a:rPr>
+              <a:t>// your code here</a:t>
+            </a:r>
+          </a:p>
+          <a:p>
+            <a:pPr marL="0" indent="0">
+              <a:buNone/>
+            </a:pPr>
+            <a:r>
+              <a:rPr lang="en-US" dirty="0" smtClean="0">
+                <a:solidFill>
+                  <a:schemeClr val="accent3"/>
+                </a:solidFill>
+              </a:rPr>
+              <a:t>});</a:t>
+            </a:r>
+            <a:endParaRPr lang="en-US" dirty="0">
+              <a:solidFill>
+                <a:schemeClr val="accent3"/>
+              </a:solidFill>
+            </a:endParaRPr>
+          </a:p>
+        </p:txBody>
+      </p:sp>
+      <p:sp>
+        <p:nvSpPr>
+          <p:cNvPr id="4" name="Date Placeholder 3"/>
+          <p:cNvSpPr>
+            <a:spLocks noGrp="1"/>
+          </p:cNvSpPr>
+          <p:nvPr>
+            <p:ph type="dt" sz="half" idx="10"/>
+          </p:nvPr>
+        </p:nvSpPr>
+        <p:spPr/>
+        <p:txBody>
+          <a:bodyPr/>
+          <a:lstStyle/>
+          <a:p>
+            <a:fld id="{1CC94077-FDE3-401A-BCD8-35C08F9C8E9C}" type="datetime1">
+              <a:rPr lang="en-US" smtClean="0"/>
+              <a:t>9/20/2015</a:t>
+            </a:fld>
+            <a:endParaRPr lang="en-US"/>
+          </a:p>
+        </p:txBody>
+      </p:sp>
+      <p:sp>
+        <p:nvSpPr>
+          <p:cNvPr id="5" name="Footer Placeholder 4"/>
+          <p:cNvSpPr>
+            <a:spLocks noGrp="1"/>
+          </p:cNvSpPr>
+          <p:nvPr>
+            <p:ph type="ftr" sz="quarter" idx="11"/>
+          </p:nvPr>
+        </p:nvSpPr>
+        <p:spPr/>
+        <p:txBody>
+          <a:bodyPr/>
+          <a:lstStyle/>
+          <a:p>
+            <a:r>
+              <a:rPr lang="en-US" smtClean="0"/>
+              <a:t>Palle Cogburn, palle@4thex.com</a:t>
+            </a:r>
+            <a:endParaRPr lang="en-US"/>
+          </a:p>
+        </p:txBody>
+      </p:sp>
+      <p:sp>
+        <p:nvSpPr>
+          <p:cNvPr id="6" name="Slide Number Placeholder 5"/>
+          <p:cNvSpPr>
+            <a:spLocks noGrp="1"/>
+          </p:cNvSpPr>
+          <p:nvPr>
+            <p:ph type="sldNum" sz="quarter" idx="12"/>
+          </p:nvPr>
+        </p:nvSpPr>
+        <p:spPr/>
+        <p:txBody>
+          <a:bodyPr/>
+          <a:lstStyle/>
+          <a:p>
+            <a:fld id="{0B3765CF-4554-48AB-8D79-291058ADFA6B}" type="slidenum">
+              <a:rPr lang="en-US" smtClean="0"/>
+              <a:t>22</a:t>
+            </a:fld>
+            <a:endParaRPr lang="en-US"/>
+          </a:p>
+        </p:txBody>
+      </p:sp>
+    </p:spTree>
+    <p:extLst>
+      <p:ext uri="{BB962C8B-B14F-4D97-AF65-F5344CB8AC3E}">
+        <p14:creationId xmlns:p14="http://schemas.microsoft.com/office/powerpoint/2010/main" val="280760774"/>
+      </p:ext>
+    </p:extLst>
+  </p:cSld>
+  <p:clrMapOvr>
+    <a:masterClrMapping/>
+  </p:clrMapOvr>
+  <p:timing>
+    <p:tnLst>
+      <p:par>
+        <p:cTn id="1" dur="indefinite" restart="never" nodeType="tmRoot"/>
+      </p:par>
+    </p:tnLst>
+  </p:timing>
+</p:sld>
+</file>
+
+<file path=ppt/slides/slide23.xml><?xml version="1.0" encoding="utf-8"?>
+<p:sld xmlns:a="http://schemas.openxmlformats.org/drawingml/2006/main" xmlns:r="http://schemas.openxmlformats.org/officeDocument/2006/relationships" xmlns:p="http://schemas.openxmlformats.org/presentationml/2006/main">
+  <p:cSld>
+    <p:spTree>
+      <p:nvGrpSpPr>
+        <p:cNvPr id="1" name=""/>
+        <p:cNvGrpSpPr/>
+        <p:nvPr/>
+      </p:nvGrpSpPr>
+      <p:grpSpPr>
+        <a:xfrm>
+          <a:off x="0" y="0"/>
+          <a:ext cx="0" cy="0"/>
+          <a:chOff x="0" y="0"/>
+          <a:chExt cx="0" cy="0"/>
+        </a:xfrm>
+      </p:grpSpPr>
+      <p:sp>
+        <p:nvSpPr>
+          <p:cNvPr id="2" name="Title 1"/>
+          <p:cNvSpPr>
+            <a:spLocks noGrp="1"/>
+          </p:cNvSpPr>
+          <p:nvPr>
+            <p:ph type="title"/>
+          </p:nvPr>
+        </p:nvSpPr>
+        <p:spPr/>
+        <p:txBody>
+          <a:bodyPr/>
+          <a:lstStyle/>
+          <a:p>
+            <a:r>
+              <a:rPr lang="en-US" dirty="0" err="1" smtClean="0"/>
+              <a:t>JSRobot</a:t>
+            </a:r>
+            <a:endParaRPr lang="en-US" dirty="0"/>
+          </a:p>
+        </p:txBody>
+      </p:sp>
+      <p:sp>
+        <p:nvSpPr>
+          <p:cNvPr id="3" name="Content Placeholder 2"/>
+          <p:cNvSpPr>
+            <a:spLocks noGrp="1"/>
+          </p:cNvSpPr>
+          <p:nvPr>
+            <p:ph idx="1"/>
+          </p:nvPr>
+        </p:nvSpPr>
+        <p:spPr/>
+        <p:txBody>
+          <a:bodyPr/>
+          <a:lstStyle/>
+          <a:p>
+            <a:pPr marL="0" indent="0">
+              <a:buNone/>
+            </a:pPr>
+            <a:r>
+              <a:rPr lang="en-US" dirty="0" err="1" smtClean="0">
+                <a:solidFill>
+                  <a:schemeClr val="accent3"/>
+                </a:solidFill>
+              </a:rPr>
+              <a:t>var</a:t>
+            </a:r>
+            <a:r>
+              <a:rPr lang="en-US" dirty="0" smtClean="0">
+                <a:solidFill>
+                  <a:schemeClr val="accent3"/>
+                </a:solidFill>
+              </a:rPr>
+              <a:t> </a:t>
+            </a:r>
+            <a:r>
+              <a:rPr lang="en-US" dirty="0">
+                <a:solidFill>
+                  <a:schemeClr val="accent3"/>
+                </a:solidFill>
+              </a:rPr>
+              <a:t>field = Field();</a:t>
+            </a:r>
+          </a:p>
+          <a:p>
+            <a:pPr marL="0" indent="0">
+              <a:buNone/>
+            </a:pPr>
+            <a:r>
+              <a:rPr lang="en-US" dirty="0" err="1" smtClean="0">
+                <a:solidFill>
+                  <a:schemeClr val="accent3"/>
+                </a:solidFill>
+              </a:rPr>
+              <a:t>var</a:t>
+            </a:r>
+            <a:r>
+              <a:rPr lang="en-US" dirty="0" smtClean="0">
+                <a:solidFill>
+                  <a:schemeClr val="accent3"/>
+                </a:solidFill>
+              </a:rPr>
+              <a:t> </a:t>
+            </a:r>
+            <a:r>
+              <a:rPr lang="en-US" dirty="0">
+                <a:solidFill>
+                  <a:schemeClr val="accent3"/>
+                </a:solidFill>
+              </a:rPr>
+              <a:t>robot = </a:t>
+            </a:r>
+            <a:r>
+              <a:rPr lang="en-US" dirty="0" err="1" smtClean="0">
+                <a:solidFill>
+                  <a:schemeClr val="accent3"/>
+                </a:solidFill>
+              </a:rPr>
+              <a:t>JSRobot</a:t>
+            </a:r>
+            <a:r>
+              <a:rPr lang="en-US" dirty="0" smtClean="0">
+                <a:solidFill>
+                  <a:schemeClr val="accent3"/>
+                </a:solidFill>
+              </a:rPr>
+              <a:t>();</a:t>
+            </a:r>
+            <a:endParaRPr lang="en-US" dirty="0">
+              <a:solidFill>
+                <a:schemeClr val="accent3"/>
+              </a:solidFill>
+            </a:endParaRPr>
+          </a:p>
+          <a:p>
+            <a:pPr marL="0" indent="0">
+              <a:buNone/>
+            </a:pPr>
+            <a:r>
+              <a:rPr lang="en-US" dirty="0" err="1" smtClean="0">
+                <a:solidFill>
+                  <a:schemeClr val="accent3"/>
+                </a:solidFill>
+              </a:rPr>
+              <a:t>field.add</a:t>
+            </a:r>
+            <a:r>
+              <a:rPr lang="en-US" dirty="0" smtClean="0">
+                <a:solidFill>
+                  <a:schemeClr val="accent3"/>
+                </a:solidFill>
+              </a:rPr>
+              <a:t>(robot);</a:t>
+            </a:r>
+            <a:endParaRPr lang="en-US" dirty="0">
+              <a:solidFill>
+                <a:schemeClr val="accent3"/>
+              </a:solidFill>
+            </a:endParaRPr>
+          </a:p>
+        </p:txBody>
+      </p:sp>
+      <p:sp>
+        <p:nvSpPr>
+          <p:cNvPr id="4" name="Date Placeholder 3"/>
+          <p:cNvSpPr>
+            <a:spLocks noGrp="1"/>
+          </p:cNvSpPr>
+          <p:nvPr>
+            <p:ph type="dt" sz="half" idx="10"/>
+          </p:nvPr>
+        </p:nvSpPr>
+        <p:spPr/>
+        <p:txBody>
+          <a:bodyPr/>
+          <a:lstStyle/>
+          <a:p>
+            <a:fld id="{1CC94077-FDE3-401A-BCD8-35C08F9C8E9C}" type="datetime1">
+              <a:rPr lang="en-US" smtClean="0"/>
+              <a:t>9/20/2015</a:t>
+            </a:fld>
+            <a:endParaRPr lang="en-US"/>
+          </a:p>
+        </p:txBody>
+      </p:sp>
+      <p:sp>
+        <p:nvSpPr>
+          <p:cNvPr id="5" name="Footer Placeholder 4"/>
+          <p:cNvSpPr>
+            <a:spLocks noGrp="1"/>
+          </p:cNvSpPr>
+          <p:nvPr>
+            <p:ph type="ftr" sz="quarter" idx="11"/>
+          </p:nvPr>
+        </p:nvSpPr>
+        <p:spPr/>
+        <p:txBody>
+          <a:bodyPr/>
+          <a:lstStyle/>
+          <a:p>
+            <a:r>
+              <a:rPr lang="en-US" smtClean="0"/>
+              <a:t>Palle Cogburn, palle@4thex.com</a:t>
+            </a:r>
+            <a:endParaRPr lang="en-US"/>
+          </a:p>
+        </p:txBody>
+      </p:sp>
+      <p:sp>
+        <p:nvSpPr>
+          <p:cNvPr id="6" name="Slide Number Placeholder 5"/>
+          <p:cNvSpPr>
+            <a:spLocks noGrp="1"/>
+          </p:cNvSpPr>
+          <p:nvPr>
+            <p:ph type="sldNum" sz="quarter" idx="12"/>
+          </p:nvPr>
+        </p:nvSpPr>
+        <p:spPr/>
+        <p:txBody>
+          <a:bodyPr/>
+          <a:lstStyle/>
+          <a:p>
+            <a:fld id="{0B3765CF-4554-48AB-8D79-291058ADFA6B}" type="slidenum">
+              <a:rPr lang="en-US" smtClean="0"/>
+              <a:t>23</a:t>
+            </a:fld>
+            <a:endParaRPr lang="en-US"/>
+          </a:p>
+        </p:txBody>
+      </p:sp>
+      <p:pic>
+        <p:nvPicPr>
+          <p:cNvPr id="1026" name="Picture 2"/>
+          <p:cNvPicPr>
+            <a:picLocks noChangeAspect="1" noChangeArrowheads="1"/>
+          </p:cNvPicPr>
+          <p:nvPr/>
+        </p:nvPicPr>
+        <p:blipFill>
+          <a:blip r:embed="rId2">
+            <a:extLst>
+              <a:ext uri="{28A0092B-C50C-407E-A947-70E740481C1C}">
+                <a14:useLocalDpi xmlns:a14="http://schemas.microsoft.com/office/drawing/2010/main" val="0"/>
+              </a:ext>
+            </a:extLst>
+          </a:blip>
+          <a:srcRect/>
+          <a:stretch>
+            <a:fillRect/>
+          </a:stretch>
+        </p:blipFill>
+        <p:spPr bwMode="auto">
+          <a:xfrm>
+            <a:off x="5486400" y="2743200"/>
+            <a:ext cx="3190974" cy="3200400"/>
+          </a:xfrm>
+          <a:prstGeom prst="rect">
+            <a:avLst/>
+          </a:prstGeom>
+          <a:noFill/>
+          <a:ln w="9525">
+            <a:solidFill>
+              <a:schemeClr val="tx1"/>
+            </a:solidFill>
+            <a:miter lim="800000"/>
+            <a:headEnd/>
+            <a:tailEnd/>
+          </a:ln>
+          <a:extLst>
+            <a:ext uri="{909E8E84-426E-40DD-AFC4-6F175D3DCCD1}">
+              <a14:hiddenFill xmlns:a14="http://schemas.microsoft.com/office/drawing/2010/main">
+                <a:solidFill>
+                  <a:schemeClr val="accent1"/>
+                </a:solidFill>
+              </a14:hiddenFill>
+            </a:ext>
+          </a:extLst>
+        </p:spPr>
+      </p:pic>
+    </p:spTree>
+    <p:extLst>
+      <p:ext uri="{BB962C8B-B14F-4D97-AF65-F5344CB8AC3E}">
+        <p14:creationId xmlns:p14="http://schemas.microsoft.com/office/powerpoint/2010/main" val="3369134733"/>
+      </p:ext>
+    </p:extLst>
+  </p:cSld>
+  <p:clrMapOvr>
+    <a:masterClrMapping/>
+  </p:clrMapOvr>
+  <p:timing>
+    <p:tnLst>
+      <p:par>
+        <p:cTn id="1" dur="indefinite" restart="never" nodeType="tmRoot"/>
+      </p:par>
+    </p:tnLst>
+  </p:timing>
+</p:sld>
+</file>
+
+<file path=ppt/slides/slide24.xml><?xml version="1.0" encoding="utf-8"?>
+<p:sld xmlns:a="http://schemas.openxmlformats.org/drawingml/2006/main" xmlns:r="http://schemas.openxmlformats.org/officeDocument/2006/relationships" xmlns:p="http://schemas.openxmlformats.org/presentationml/2006/main">
+  <p:cSld>
+    <p:spTree>
+      <p:nvGrpSpPr>
+        <p:cNvPr id="1" name=""/>
+        <p:cNvGrpSpPr/>
+        <p:nvPr/>
+      </p:nvGrpSpPr>
+      <p:grpSpPr>
+        <a:xfrm>
+          <a:off x="0" y="0"/>
+          <a:ext cx="0" cy="0"/>
+          <a:chOff x="0" y="0"/>
+          <a:chExt cx="0" cy="0"/>
+        </a:xfrm>
+      </p:grpSpPr>
+      <p:sp>
+        <p:nvSpPr>
+          <p:cNvPr id="2" name="Title 1"/>
+          <p:cNvSpPr>
+            <a:spLocks noGrp="1"/>
+          </p:cNvSpPr>
+          <p:nvPr>
+            <p:ph type="title"/>
+          </p:nvPr>
+        </p:nvSpPr>
+        <p:spPr/>
+        <p:txBody>
+          <a:bodyPr/>
+          <a:lstStyle/>
+          <a:p>
+            <a:r>
+              <a:rPr lang="en-US" dirty="0" smtClean="0"/>
+              <a:t>Set speeds</a:t>
+            </a:r>
+            <a:endParaRPr lang="en-US" dirty="0"/>
+          </a:p>
+        </p:txBody>
+      </p:sp>
+      <p:sp>
+        <p:nvSpPr>
+          <p:cNvPr id="3" name="Content Placeholder 2"/>
+          <p:cNvSpPr>
+            <a:spLocks noGrp="1"/>
+          </p:cNvSpPr>
+          <p:nvPr>
+            <p:ph idx="1"/>
+          </p:nvPr>
+        </p:nvSpPr>
+        <p:spPr/>
+        <p:txBody>
+          <a:bodyPr/>
+          <a:lstStyle/>
+          <a:p>
+            <a:pPr marL="0" indent="0">
+              <a:buNone/>
+            </a:pPr>
+            <a:r>
+              <a:rPr lang="en-US" dirty="0" err="1" smtClean="0">
+                <a:solidFill>
+                  <a:schemeClr val="accent3"/>
+                </a:solidFill>
+              </a:rPr>
+              <a:t>robot.setSpeeds</a:t>
+            </a:r>
+            <a:r>
+              <a:rPr lang="en-US" dirty="0" smtClean="0">
+                <a:solidFill>
+                  <a:schemeClr val="accent3"/>
+                </a:solidFill>
+              </a:rPr>
+              <a:t>(right, left);</a:t>
+            </a:r>
+          </a:p>
+          <a:p>
+            <a:pPr marL="0" indent="0">
+              <a:buNone/>
+            </a:pPr>
+            <a:endParaRPr lang="en-US" dirty="0">
+              <a:solidFill>
+                <a:schemeClr val="accent3"/>
+              </a:solidFill>
+            </a:endParaRPr>
+          </a:p>
+          <a:p>
+            <a:pPr marL="0" indent="0">
+              <a:buNone/>
+            </a:pPr>
+            <a:r>
+              <a:rPr lang="en-US" dirty="0" smtClean="0"/>
+              <a:t>Make the robot:</a:t>
+            </a:r>
+          </a:p>
+          <a:p>
+            <a:pPr marL="514350" indent="-514350">
+              <a:buAutoNum type="arabicPeriod"/>
+            </a:pPr>
+            <a:r>
+              <a:rPr lang="en-US" dirty="0" smtClean="0"/>
+              <a:t>Move forward</a:t>
+            </a:r>
+          </a:p>
+          <a:p>
+            <a:pPr marL="514350" indent="-514350">
+              <a:buAutoNum type="arabicPeriod"/>
+            </a:pPr>
+            <a:r>
+              <a:rPr lang="en-US" dirty="0" smtClean="0"/>
+              <a:t>Move backwards</a:t>
+            </a:r>
+          </a:p>
+          <a:p>
+            <a:pPr marL="514350" indent="-514350">
+              <a:buAutoNum type="arabicPeriod"/>
+            </a:pPr>
+            <a:r>
+              <a:rPr lang="en-US" dirty="0" smtClean="0"/>
+              <a:t>Spin clockwise</a:t>
+            </a:r>
+          </a:p>
+          <a:p>
+            <a:pPr marL="514350" indent="-514350">
+              <a:buAutoNum type="arabicPeriod"/>
+            </a:pPr>
+            <a:r>
+              <a:rPr lang="en-US" dirty="0" smtClean="0"/>
+              <a:t>Make a circle</a:t>
+            </a:r>
+          </a:p>
+        </p:txBody>
+      </p:sp>
+      <p:sp>
+        <p:nvSpPr>
+          <p:cNvPr id="4" name="Date Placeholder 3"/>
+          <p:cNvSpPr>
+            <a:spLocks noGrp="1"/>
+          </p:cNvSpPr>
+          <p:nvPr>
+            <p:ph type="dt" sz="half" idx="10"/>
+          </p:nvPr>
+        </p:nvSpPr>
+        <p:spPr/>
+        <p:txBody>
+          <a:bodyPr/>
+          <a:lstStyle/>
+          <a:p>
+            <a:fld id="{1CC94077-FDE3-401A-BCD8-35C08F9C8E9C}" type="datetime1">
+              <a:rPr lang="en-US" smtClean="0"/>
+              <a:t>9/20/2015</a:t>
+            </a:fld>
+            <a:endParaRPr lang="en-US"/>
+          </a:p>
+        </p:txBody>
+      </p:sp>
+      <p:sp>
+        <p:nvSpPr>
+          <p:cNvPr id="5" name="Footer Placeholder 4"/>
+          <p:cNvSpPr>
+            <a:spLocks noGrp="1"/>
+          </p:cNvSpPr>
+          <p:nvPr>
+            <p:ph type="ftr" sz="quarter" idx="11"/>
+          </p:nvPr>
+        </p:nvSpPr>
+        <p:spPr/>
+        <p:txBody>
+          <a:bodyPr/>
+          <a:lstStyle/>
+          <a:p>
+            <a:r>
+              <a:rPr lang="en-US" smtClean="0"/>
+              <a:t>Palle Cogburn, palle@4thex.com</a:t>
+            </a:r>
+            <a:endParaRPr lang="en-US"/>
+          </a:p>
+        </p:txBody>
+      </p:sp>
+      <p:sp>
+        <p:nvSpPr>
+          <p:cNvPr id="6" name="Slide Number Placeholder 5"/>
+          <p:cNvSpPr>
+            <a:spLocks noGrp="1"/>
+          </p:cNvSpPr>
+          <p:nvPr>
+            <p:ph type="sldNum" sz="quarter" idx="12"/>
+          </p:nvPr>
+        </p:nvSpPr>
+        <p:spPr/>
+        <p:txBody>
+          <a:bodyPr/>
+          <a:lstStyle/>
+          <a:p>
+            <a:fld id="{0B3765CF-4554-48AB-8D79-291058ADFA6B}" type="slidenum">
+              <a:rPr lang="en-US" smtClean="0"/>
+              <a:t>24</a:t>
+            </a:fld>
+            <a:endParaRPr lang="en-US"/>
+          </a:p>
+        </p:txBody>
+      </p:sp>
+    </p:spTree>
+    <p:extLst>
+      <p:ext uri="{BB962C8B-B14F-4D97-AF65-F5344CB8AC3E}">
+        <p14:creationId xmlns:p14="http://schemas.microsoft.com/office/powerpoint/2010/main" val="3582917609"/>
+      </p:ext>
+    </p:extLst>
+  </p:cSld>
+  <p:clrMapOvr>
+    <a:masterClrMapping/>
+  </p:clrMapOvr>
+  <p:timing>
+    <p:tnLst>
+      <p:par>
+        <p:cTn id="1" dur="indefinite" restart="never" nodeType="tmRoot"/>
+      </p:par>
+    </p:tnLst>
+  </p:timing>
+</p:sld>
+</file>
+
+<file path=ppt/slides/slide25.xml><?xml version="1.0" encoding="utf-8"?>
+<p:sld xmlns:a="http://schemas.openxmlformats.org/drawingml/2006/main" xmlns:r="http://schemas.openxmlformats.org/officeDocument/2006/relationships" xmlns:p="http://schemas.openxmlformats.org/presentationml/2006/main">
+  <p:cSld>
+    <p:spTree>
+      <p:nvGrpSpPr>
+        <p:cNvPr id="1" name=""/>
+        <p:cNvGrpSpPr/>
+        <p:nvPr/>
+      </p:nvGrpSpPr>
+      <p:grpSpPr>
+        <a:xfrm>
+          <a:off x="0" y="0"/>
+          <a:ext cx="0" cy="0"/>
+          <a:chOff x="0" y="0"/>
+          <a:chExt cx="0" cy="0"/>
+        </a:xfrm>
+      </p:grpSpPr>
+      <p:sp>
+        <p:nvSpPr>
+          <p:cNvPr id="2" name="Title 1"/>
+          <p:cNvSpPr>
+            <a:spLocks noGrp="1"/>
+          </p:cNvSpPr>
+          <p:nvPr>
+            <p:ph type="title"/>
+          </p:nvPr>
+        </p:nvSpPr>
+        <p:spPr/>
+        <p:txBody>
+          <a:bodyPr/>
+          <a:lstStyle/>
+          <a:p>
+            <a:r>
+              <a:rPr lang="en-US" dirty="0" smtClean="0"/>
+              <a:t>Set start</a:t>
+            </a:r>
+            <a:endParaRPr lang="en-US" dirty="0"/>
+          </a:p>
+        </p:txBody>
+      </p:sp>
+      <p:sp>
+        <p:nvSpPr>
+          <p:cNvPr id="3" name="Content Placeholder 2"/>
+          <p:cNvSpPr>
+            <a:spLocks noGrp="1"/>
+          </p:cNvSpPr>
+          <p:nvPr>
+            <p:ph idx="1"/>
+          </p:nvPr>
+        </p:nvSpPr>
+        <p:spPr/>
+        <p:txBody>
+          <a:bodyPr/>
+          <a:lstStyle/>
+          <a:p>
+            <a:pPr marL="0" indent="0">
+              <a:buNone/>
+            </a:pPr>
+            <a:r>
+              <a:rPr lang="nb-NO" dirty="0">
+                <a:solidFill>
+                  <a:schemeClr val="accent3"/>
+                </a:solidFill>
+              </a:rPr>
+              <a:t>var </a:t>
+            </a:r>
+            <a:r>
+              <a:rPr lang="nb-NO" dirty="0" smtClean="0">
+                <a:solidFill>
+                  <a:schemeClr val="accent3"/>
+                </a:solidFill>
+              </a:rPr>
+              <a:t>robot </a:t>
+            </a:r>
+            <a:r>
+              <a:rPr lang="nb-NO" dirty="0">
+                <a:solidFill>
+                  <a:schemeClr val="accent3"/>
+                </a:solidFill>
+              </a:rPr>
+              <a:t>= JSRobot({x: </a:t>
+            </a:r>
+            <a:r>
+              <a:rPr lang="nb-NO" dirty="0" smtClean="0">
+                <a:solidFill>
+                  <a:schemeClr val="accent3"/>
+                </a:solidFill>
+              </a:rPr>
+              <a:t>horizontal, </a:t>
+            </a:r>
+            <a:r>
+              <a:rPr lang="nb-NO" dirty="0">
+                <a:solidFill>
+                  <a:schemeClr val="accent3"/>
+                </a:solidFill>
+              </a:rPr>
+              <a:t>y: </a:t>
+            </a:r>
+            <a:r>
+              <a:rPr lang="nb-NO" dirty="0" smtClean="0">
+                <a:solidFill>
+                  <a:schemeClr val="accent3"/>
+                </a:solidFill>
+              </a:rPr>
+              <a:t>vertical});</a:t>
+            </a:r>
+          </a:p>
+          <a:p>
+            <a:pPr marL="0" indent="0">
+              <a:buNone/>
+            </a:pPr>
+            <a:endParaRPr lang="nb-NO" dirty="0">
+              <a:solidFill>
+                <a:schemeClr val="accent3"/>
+              </a:solidFill>
+            </a:endParaRPr>
+          </a:p>
+          <a:p>
+            <a:pPr marL="0" indent="0">
+              <a:buNone/>
+            </a:pPr>
+            <a:r>
+              <a:rPr lang="nb-NO" dirty="0" smtClean="0">
+                <a:solidFill>
+                  <a:schemeClr val="accent3"/>
+                </a:solidFill>
+              </a:rPr>
+              <a:t>Make the robot start:</a:t>
+            </a:r>
+          </a:p>
+          <a:p>
+            <a:pPr marL="514350" indent="-514350">
+              <a:buFont typeface="+mj-lt"/>
+              <a:buAutoNum type="arabicPeriod"/>
+            </a:pPr>
+            <a:r>
+              <a:rPr lang="nb-NO" dirty="0" smtClean="0">
+                <a:solidFill>
+                  <a:schemeClr val="accent3"/>
+                </a:solidFill>
+              </a:rPr>
+              <a:t>In the middle</a:t>
+            </a:r>
+          </a:p>
+          <a:p>
+            <a:pPr marL="514350" indent="-514350">
+              <a:buFont typeface="+mj-lt"/>
+              <a:buAutoNum type="arabicPeriod"/>
+            </a:pPr>
+            <a:r>
+              <a:rPr lang="nb-NO" dirty="0" smtClean="0">
+                <a:solidFill>
+                  <a:schemeClr val="accent3"/>
+                </a:solidFill>
+              </a:rPr>
+              <a:t>In the top left corner</a:t>
+            </a:r>
+          </a:p>
+          <a:p>
+            <a:pPr marL="514350" indent="-514350">
+              <a:buFont typeface="+mj-lt"/>
+              <a:buAutoNum type="arabicPeriod"/>
+            </a:pPr>
+            <a:r>
+              <a:rPr lang="nb-NO" dirty="0" smtClean="0">
+                <a:solidFill>
+                  <a:schemeClr val="accent3"/>
+                </a:solidFill>
+              </a:rPr>
+              <a:t>In the bottom left corner</a:t>
+            </a:r>
+          </a:p>
+          <a:p>
+            <a:pPr marL="514350" indent="-514350">
+              <a:buFont typeface="+mj-lt"/>
+              <a:buAutoNum type="arabicPeriod"/>
+            </a:pPr>
+            <a:r>
+              <a:rPr lang="nb-NO" dirty="0" smtClean="0">
+                <a:solidFill>
+                  <a:schemeClr val="accent3"/>
+                </a:solidFill>
+              </a:rPr>
+              <a:t>In the bottom right corner</a:t>
+            </a:r>
+            <a:endParaRPr lang="en-US" dirty="0">
+              <a:solidFill>
+                <a:schemeClr val="accent3"/>
+              </a:solidFill>
+            </a:endParaRPr>
+          </a:p>
+        </p:txBody>
+      </p:sp>
+      <p:sp>
+        <p:nvSpPr>
+          <p:cNvPr id="4" name="Date Placeholder 3"/>
+          <p:cNvSpPr>
+            <a:spLocks noGrp="1"/>
+          </p:cNvSpPr>
+          <p:nvPr>
+            <p:ph type="dt" sz="half" idx="10"/>
+          </p:nvPr>
+        </p:nvSpPr>
+        <p:spPr/>
+        <p:txBody>
+          <a:bodyPr/>
+          <a:lstStyle/>
+          <a:p>
+            <a:fld id="{1CC94077-FDE3-401A-BCD8-35C08F9C8E9C}" type="datetime1">
+              <a:rPr lang="en-US" smtClean="0"/>
+              <a:t>9/20/2015</a:t>
+            </a:fld>
+            <a:endParaRPr lang="en-US"/>
+          </a:p>
+        </p:txBody>
+      </p:sp>
+      <p:sp>
+        <p:nvSpPr>
+          <p:cNvPr id="5" name="Footer Placeholder 4"/>
+          <p:cNvSpPr>
+            <a:spLocks noGrp="1"/>
+          </p:cNvSpPr>
+          <p:nvPr>
+            <p:ph type="ftr" sz="quarter" idx="11"/>
+          </p:nvPr>
+        </p:nvSpPr>
+        <p:spPr/>
+        <p:txBody>
+          <a:bodyPr/>
+          <a:lstStyle/>
+          <a:p>
+            <a:r>
+              <a:rPr lang="en-US" smtClean="0"/>
+              <a:t>Palle Cogburn, palle@4thex.com</a:t>
+            </a:r>
+            <a:endParaRPr lang="en-US"/>
+          </a:p>
+        </p:txBody>
+      </p:sp>
+      <p:sp>
+        <p:nvSpPr>
+          <p:cNvPr id="6" name="Slide Number Placeholder 5"/>
+          <p:cNvSpPr>
+            <a:spLocks noGrp="1"/>
+          </p:cNvSpPr>
+          <p:nvPr>
+            <p:ph type="sldNum" sz="quarter" idx="12"/>
+          </p:nvPr>
+        </p:nvSpPr>
+        <p:spPr/>
+        <p:txBody>
+          <a:bodyPr/>
+          <a:lstStyle/>
+          <a:p>
+            <a:fld id="{0B3765CF-4554-48AB-8D79-291058ADFA6B}" type="slidenum">
+              <a:rPr lang="en-US" smtClean="0"/>
+              <a:t>25</a:t>
+            </a:fld>
+            <a:endParaRPr lang="en-US"/>
+          </a:p>
+        </p:txBody>
+      </p:sp>
+      <p:pic>
+        <p:nvPicPr>
+          <p:cNvPr id="2050" name="Picture 2"/>
+          <p:cNvPicPr>
+            <a:picLocks noChangeAspect="1" noChangeArrowheads="1"/>
+          </p:cNvPicPr>
+          <p:nvPr/>
+        </p:nvPicPr>
+        <p:blipFill>
+          <a:blip r:embed="rId2">
+            <a:extLst>
+              <a:ext uri="{28A0092B-C50C-407E-A947-70E740481C1C}">
+                <a14:useLocalDpi xmlns:a14="http://schemas.microsoft.com/office/drawing/2010/main" val="0"/>
+              </a:ext>
+            </a:extLst>
+          </a:blip>
+          <a:srcRect/>
+          <a:stretch>
+            <a:fillRect/>
+          </a:stretch>
+        </p:blipFill>
+        <p:spPr bwMode="auto">
+          <a:xfrm>
+            <a:off x="5486400" y="2743200"/>
+            <a:ext cx="3195680" cy="3200400"/>
+          </a:xfrm>
+          <a:prstGeom prst="rect">
+            <a:avLst/>
+          </a:prstGeom>
+          <a:noFill/>
+          <a:ln w="9525">
+            <a:solidFill>
+              <a:schemeClr val="tx1"/>
+            </a:solidFill>
+            <a:miter lim="800000"/>
+            <a:headEnd/>
+            <a:tailEnd/>
+          </a:ln>
+          <a:extLst>
+            <a:ext uri="{909E8E84-426E-40DD-AFC4-6F175D3DCCD1}">
+              <a14:hiddenFill xmlns:a14="http://schemas.microsoft.com/office/drawing/2010/main">
+                <a:solidFill>
+                  <a:schemeClr val="accent1"/>
+                </a:solidFill>
+              </a14:hiddenFill>
+            </a:ext>
+          </a:extLst>
+        </p:spPr>
+      </p:pic>
+    </p:spTree>
+    <p:extLst>
+      <p:ext uri="{BB962C8B-B14F-4D97-AF65-F5344CB8AC3E}">
+        <p14:creationId xmlns:p14="http://schemas.microsoft.com/office/powerpoint/2010/main" val="2505577594"/>
+      </p:ext>
+    </p:extLst>
+  </p:cSld>
+  <p:clrMapOvr>
+    <a:masterClrMapping/>
+  </p:clrMapOvr>
+  <p:timing>
+    <p:tnLst>
+      <p:par>
+        <p:cTn id="1" dur="indefinite" restart="never" nodeType="tmRoot"/>
+      </p:par>
+    </p:tnLst>
+  </p:timing>
+</p:sld>
+</file>
+
+<file path=ppt/slides/slide26.xml><?xml version="1.0" encoding="utf-8"?>
+<p:sld xmlns:a="http://schemas.openxmlformats.org/drawingml/2006/main" xmlns:r="http://schemas.openxmlformats.org/officeDocument/2006/relationships" xmlns:p="http://schemas.openxmlformats.org/presentationml/2006/main">
+  <p:cSld>
+    <p:spTree>
+      <p:nvGrpSpPr>
+        <p:cNvPr id="1" name=""/>
+        <p:cNvGrpSpPr/>
+        <p:nvPr/>
+      </p:nvGrpSpPr>
+      <p:grpSpPr>
+        <a:xfrm>
+          <a:off x="0" y="0"/>
+          <a:ext cx="0" cy="0"/>
+          <a:chOff x="0" y="0"/>
+          <a:chExt cx="0" cy="0"/>
+        </a:xfrm>
+      </p:grpSpPr>
+      <p:sp>
+        <p:nvSpPr>
+          <p:cNvPr id="2" name="Title 1"/>
+          <p:cNvSpPr>
+            <a:spLocks noGrp="1"/>
+          </p:cNvSpPr>
+          <p:nvPr>
+            <p:ph type="title"/>
+          </p:nvPr>
+        </p:nvSpPr>
+        <p:spPr/>
+        <p:txBody>
+          <a:bodyPr/>
+          <a:lstStyle/>
+          <a:p>
+            <a:r>
+              <a:rPr lang="en-US" dirty="0" smtClean="0"/>
+              <a:t>Set color</a:t>
+            </a:r>
+            <a:endParaRPr lang="en-US" dirty="0"/>
+          </a:p>
+        </p:txBody>
+      </p:sp>
+      <p:sp>
+        <p:nvSpPr>
+          <p:cNvPr id="3" name="Content Placeholder 2"/>
+          <p:cNvSpPr>
+            <a:spLocks noGrp="1"/>
+          </p:cNvSpPr>
+          <p:nvPr>
+            <p:ph idx="1"/>
+          </p:nvPr>
+        </p:nvSpPr>
+        <p:spPr/>
+        <p:txBody>
+          <a:bodyPr/>
+          <a:lstStyle/>
+          <a:p>
+            <a:pPr marL="0" indent="0">
+              <a:buNone/>
+            </a:pPr>
+            <a:r>
+              <a:rPr lang="en-US" dirty="0" err="1">
+                <a:solidFill>
+                  <a:schemeClr val="accent3"/>
+                </a:solidFill>
+              </a:rPr>
+              <a:t>var</a:t>
+            </a:r>
+            <a:r>
+              <a:rPr lang="en-US" dirty="0">
+                <a:solidFill>
+                  <a:schemeClr val="accent3"/>
+                </a:solidFill>
+              </a:rPr>
+              <a:t> robot = </a:t>
+            </a:r>
+            <a:r>
+              <a:rPr lang="en-US" dirty="0" err="1">
+                <a:solidFill>
+                  <a:schemeClr val="accent3"/>
+                </a:solidFill>
+              </a:rPr>
+              <a:t>JSRobot</a:t>
+            </a:r>
+            <a:r>
+              <a:rPr lang="en-US" dirty="0">
+                <a:solidFill>
+                  <a:schemeClr val="accent3"/>
+                </a:solidFill>
+              </a:rPr>
+              <a:t>({x: </a:t>
+            </a:r>
+            <a:r>
+              <a:rPr lang="en-US" dirty="0" smtClean="0">
+                <a:solidFill>
+                  <a:schemeClr val="accent3"/>
+                </a:solidFill>
+              </a:rPr>
+              <a:t>horizontal, </a:t>
+            </a:r>
+            <a:r>
+              <a:rPr lang="en-US" dirty="0">
+                <a:solidFill>
+                  <a:schemeClr val="accent3"/>
+                </a:solidFill>
+              </a:rPr>
+              <a:t>y: </a:t>
+            </a:r>
+            <a:r>
+              <a:rPr lang="en-US" dirty="0" smtClean="0">
+                <a:solidFill>
+                  <a:schemeClr val="accent3"/>
+                </a:solidFill>
+              </a:rPr>
+              <a:t>vertical}, color);</a:t>
+            </a:r>
+          </a:p>
+          <a:p>
+            <a:pPr marL="0" indent="0">
+              <a:buNone/>
+            </a:pPr>
+            <a:r>
+              <a:rPr lang="en-US" i="1" dirty="0" smtClean="0"/>
+              <a:t>The color argument is a string</a:t>
+            </a:r>
+            <a:r>
+              <a:rPr lang="en-US" dirty="0" smtClean="0"/>
+              <a:t>.</a:t>
+            </a:r>
+          </a:p>
+          <a:p>
+            <a:pPr marL="0" indent="0">
+              <a:buNone/>
+            </a:pPr>
+            <a:r>
+              <a:rPr lang="en-US" dirty="0" smtClean="0"/>
+              <a:t>Make the robot:</a:t>
+            </a:r>
+          </a:p>
+          <a:p>
+            <a:pPr marL="514350" indent="-514350">
+              <a:buFont typeface="+mj-lt"/>
+              <a:buAutoNum type="arabicPeriod"/>
+            </a:pPr>
+            <a:r>
+              <a:rPr lang="en-US" dirty="0" smtClean="0">
+                <a:solidFill>
+                  <a:srgbClr val="FF0000"/>
+                </a:solidFill>
+              </a:rPr>
+              <a:t>Red</a:t>
+            </a:r>
+          </a:p>
+          <a:p>
+            <a:pPr marL="514350" indent="-514350">
+              <a:buFont typeface="+mj-lt"/>
+              <a:buAutoNum type="arabicPeriod"/>
+            </a:pPr>
+            <a:r>
+              <a:rPr lang="en-US" dirty="0" smtClean="0">
+                <a:solidFill>
+                  <a:srgbClr val="FFFF00"/>
+                </a:solidFill>
+              </a:rPr>
+              <a:t>Yellow</a:t>
+            </a:r>
+          </a:p>
+          <a:p>
+            <a:pPr marL="514350" indent="-514350">
+              <a:buFont typeface="+mj-lt"/>
+              <a:buAutoNum type="arabicPeriod"/>
+            </a:pPr>
+            <a:r>
+              <a:rPr lang="en-US" dirty="0" smtClean="0">
+                <a:solidFill>
+                  <a:srgbClr val="00B0F0"/>
+                </a:solidFill>
+              </a:rPr>
+              <a:t>Blue</a:t>
+            </a:r>
+            <a:endParaRPr lang="en-US" dirty="0">
+              <a:solidFill>
+                <a:srgbClr val="00B0F0"/>
+              </a:solidFill>
+            </a:endParaRPr>
+          </a:p>
+        </p:txBody>
+      </p:sp>
+      <p:sp>
+        <p:nvSpPr>
+          <p:cNvPr id="4" name="Date Placeholder 3"/>
+          <p:cNvSpPr>
+            <a:spLocks noGrp="1"/>
+          </p:cNvSpPr>
+          <p:nvPr>
+            <p:ph type="dt" sz="half" idx="10"/>
+          </p:nvPr>
+        </p:nvSpPr>
+        <p:spPr/>
+        <p:txBody>
+          <a:bodyPr/>
+          <a:lstStyle/>
+          <a:p>
+            <a:fld id="{1CC94077-FDE3-401A-BCD8-35C08F9C8E9C}" type="datetime1">
+              <a:rPr lang="en-US" smtClean="0"/>
+              <a:t>9/20/2015</a:t>
+            </a:fld>
+            <a:endParaRPr lang="en-US"/>
+          </a:p>
+        </p:txBody>
+      </p:sp>
+      <p:sp>
+        <p:nvSpPr>
+          <p:cNvPr id="5" name="Footer Placeholder 4"/>
+          <p:cNvSpPr>
+            <a:spLocks noGrp="1"/>
+          </p:cNvSpPr>
+          <p:nvPr>
+            <p:ph type="ftr" sz="quarter" idx="11"/>
+          </p:nvPr>
+        </p:nvSpPr>
+        <p:spPr/>
+        <p:txBody>
+          <a:bodyPr/>
+          <a:lstStyle/>
+          <a:p>
+            <a:r>
+              <a:rPr lang="en-US" smtClean="0"/>
+              <a:t>Palle Cogburn, palle@4thex.com</a:t>
+            </a:r>
+            <a:endParaRPr lang="en-US"/>
+          </a:p>
+        </p:txBody>
+      </p:sp>
+      <p:sp>
+        <p:nvSpPr>
+          <p:cNvPr id="6" name="Slide Number Placeholder 5"/>
+          <p:cNvSpPr>
+            <a:spLocks noGrp="1"/>
+          </p:cNvSpPr>
+          <p:nvPr>
+            <p:ph type="sldNum" sz="quarter" idx="12"/>
+          </p:nvPr>
+        </p:nvSpPr>
+        <p:spPr/>
+        <p:txBody>
+          <a:bodyPr/>
+          <a:lstStyle/>
+          <a:p>
+            <a:fld id="{0B3765CF-4554-48AB-8D79-291058ADFA6B}" type="slidenum">
+              <a:rPr lang="en-US" smtClean="0"/>
+              <a:t>26</a:t>
+            </a:fld>
+            <a:endParaRPr lang="en-US"/>
+          </a:p>
+        </p:txBody>
+      </p:sp>
+      <p:pic>
+        <p:nvPicPr>
+          <p:cNvPr id="3074" name="Picture 2"/>
+          <p:cNvPicPr>
+            <a:picLocks noChangeAspect="1" noChangeArrowheads="1"/>
+          </p:cNvPicPr>
+          <p:nvPr/>
+        </p:nvPicPr>
+        <p:blipFill>
+          <a:blip r:embed="rId2">
+            <a:extLst>
+              <a:ext uri="{28A0092B-C50C-407E-A947-70E740481C1C}">
+                <a14:useLocalDpi xmlns:a14="http://schemas.microsoft.com/office/drawing/2010/main" val="0"/>
+              </a:ext>
+            </a:extLst>
+          </a:blip>
+          <a:srcRect/>
+          <a:stretch>
+            <a:fillRect/>
+          </a:stretch>
+        </p:blipFill>
+        <p:spPr bwMode="auto">
+          <a:xfrm>
+            <a:off x="5486400" y="2743200"/>
+            <a:ext cx="3205127" cy="3200400"/>
+          </a:xfrm>
+          <a:prstGeom prst="rect">
+            <a:avLst/>
+          </a:prstGeom>
+          <a:noFill/>
+          <a:ln w="9525">
+            <a:solidFill>
+              <a:schemeClr val="tx1"/>
+            </a:solidFill>
+            <a:miter lim="800000"/>
+            <a:headEnd/>
+            <a:tailEnd/>
+          </a:ln>
+          <a:extLst>
+            <a:ext uri="{909E8E84-426E-40DD-AFC4-6F175D3DCCD1}">
+              <a14:hiddenFill xmlns:a14="http://schemas.microsoft.com/office/drawing/2010/main">
+                <a:solidFill>
+                  <a:schemeClr val="accent1"/>
+                </a:solidFill>
+              </a14:hiddenFill>
+            </a:ext>
+          </a:extLst>
+        </p:spPr>
+      </p:pic>
+    </p:spTree>
+    <p:extLst>
+      <p:ext uri="{BB962C8B-B14F-4D97-AF65-F5344CB8AC3E}">
+        <p14:creationId xmlns:p14="http://schemas.microsoft.com/office/powerpoint/2010/main" val="2824651636"/>
+      </p:ext>
+    </p:extLst>
+  </p:cSld>
+  <p:clrMapOvr>
+    <a:masterClrMapping/>
+  </p:clrMapOvr>
+  <p:timing>
+    <p:tnLst>
+      <p:par>
+        <p:cTn id="1" dur="indefinite" restart="never" nodeType="tmRoot"/>
+      </p:par>
+    </p:tnLst>
+  </p:timing>
+</p:sld>
+</file>
+
+<file path=ppt/slides/slide27.xml><?xml version="1.0" encoding="utf-8"?>
+<p:sld xmlns:a="http://schemas.openxmlformats.org/drawingml/2006/main" xmlns:r="http://schemas.openxmlformats.org/officeDocument/2006/relationships" xmlns:p="http://schemas.openxmlformats.org/presentationml/2006/main">
+  <p:cSld>
+    <p:spTree>
+      <p:nvGrpSpPr>
+        <p:cNvPr id="1" name=""/>
+        <p:cNvGrpSpPr/>
+        <p:nvPr/>
+      </p:nvGrpSpPr>
+      <p:grpSpPr>
+        <a:xfrm>
+          <a:off x="0" y="0"/>
+          <a:ext cx="0" cy="0"/>
+          <a:chOff x="0" y="0"/>
+          <a:chExt cx="0" cy="0"/>
+        </a:xfrm>
+      </p:grpSpPr>
+      <p:sp>
+        <p:nvSpPr>
+          <p:cNvPr id="2" name="Title 1"/>
+          <p:cNvSpPr>
+            <a:spLocks noGrp="1"/>
+          </p:cNvSpPr>
+          <p:nvPr>
+            <p:ph type="title"/>
+          </p:nvPr>
+        </p:nvSpPr>
+        <p:spPr/>
+        <p:txBody>
+          <a:bodyPr/>
+          <a:lstStyle/>
+          <a:p>
+            <a:r>
+              <a:rPr lang="en-US" dirty="0" smtClean="0"/>
+              <a:t>Make multiple robots</a:t>
+            </a:r>
+            <a:endParaRPr lang="en-US" dirty="0"/>
+          </a:p>
+        </p:txBody>
+      </p:sp>
+      <p:sp>
+        <p:nvSpPr>
+          <p:cNvPr id="3" name="Content Placeholder 2"/>
+          <p:cNvSpPr>
+            <a:spLocks noGrp="1"/>
+          </p:cNvSpPr>
+          <p:nvPr>
+            <p:ph idx="1"/>
+          </p:nvPr>
+        </p:nvSpPr>
+        <p:spPr/>
+        <p:txBody>
+          <a:bodyPr/>
+          <a:lstStyle/>
+          <a:p>
+            <a:pPr marL="0" indent="0">
+              <a:buNone/>
+            </a:pPr>
+            <a:r>
+              <a:rPr lang="en-US" dirty="0">
+                <a:solidFill>
+                  <a:schemeClr val="accent3"/>
+                </a:solidFill>
+              </a:rPr>
+              <a:t> </a:t>
+            </a:r>
+            <a:r>
+              <a:rPr lang="en-US" dirty="0" err="1" smtClean="0">
+                <a:solidFill>
+                  <a:schemeClr val="accent3"/>
+                </a:solidFill>
+              </a:rPr>
+              <a:t>field.add</a:t>
+            </a:r>
+            <a:r>
+              <a:rPr lang="en-US" dirty="0" smtClean="0">
+                <a:solidFill>
+                  <a:schemeClr val="accent3"/>
+                </a:solidFill>
+              </a:rPr>
+              <a:t>(robot);</a:t>
+            </a:r>
+            <a:endParaRPr lang="en-US" dirty="0">
+              <a:solidFill>
+                <a:schemeClr val="accent3"/>
+              </a:solidFill>
+            </a:endParaRPr>
+          </a:p>
+        </p:txBody>
+      </p:sp>
+      <p:sp>
+        <p:nvSpPr>
+          <p:cNvPr id="4" name="Date Placeholder 3"/>
+          <p:cNvSpPr>
+            <a:spLocks noGrp="1"/>
+          </p:cNvSpPr>
+          <p:nvPr>
+            <p:ph type="dt" sz="half" idx="10"/>
+          </p:nvPr>
+        </p:nvSpPr>
+        <p:spPr/>
+        <p:txBody>
+          <a:bodyPr/>
+          <a:lstStyle/>
+          <a:p>
+            <a:fld id="{1CC94077-FDE3-401A-BCD8-35C08F9C8E9C}" type="datetime1">
+              <a:rPr lang="en-US" smtClean="0"/>
+              <a:t>9/20/2015</a:t>
+            </a:fld>
+            <a:endParaRPr lang="en-US"/>
+          </a:p>
+        </p:txBody>
+      </p:sp>
+      <p:sp>
+        <p:nvSpPr>
+          <p:cNvPr id="5" name="Footer Placeholder 4"/>
+          <p:cNvSpPr>
+            <a:spLocks noGrp="1"/>
+          </p:cNvSpPr>
+          <p:nvPr>
+            <p:ph type="ftr" sz="quarter" idx="11"/>
+          </p:nvPr>
+        </p:nvSpPr>
+        <p:spPr/>
+        <p:txBody>
+          <a:bodyPr/>
+          <a:lstStyle/>
+          <a:p>
+            <a:r>
+              <a:rPr lang="en-US" smtClean="0"/>
+              <a:t>Palle Cogburn, palle@4thex.com</a:t>
+            </a:r>
+            <a:endParaRPr lang="en-US"/>
+          </a:p>
+        </p:txBody>
+      </p:sp>
+      <p:sp>
+        <p:nvSpPr>
+          <p:cNvPr id="6" name="Slide Number Placeholder 5"/>
+          <p:cNvSpPr>
+            <a:spLocks noGrp="1"/>
+          </p:cNvSpPr>
+          <p:nvPr>
+            <p:ph type="sldNum" sz="quarter" idx="12"/>
+          </p:nvPr>
+        </p:nvSpPr>
+        <p:spPr/>
+        <p:txBody>
+          <a:bodyPr/>
+          <a:lstStyle/>
+          <a:p>
+            <a:fld id="{0B3765CF-4554-48AB-8D79-291058ADFA6B}" type="slidenum">
+              <a:rPr lang="en-US" smtClean="0"/>
+              <a:t>27</a:t>
+            </a:fld>
+            <a:endParaRPr lang="en-US"/>
+          </a:p>
+        </p:txBody>
+      </p:sp>
+      <p:pic>
+        <p:nvPicPr>
+          <p:cNvPr id="4098" name="Picture 2"/>
+          <p:cNvPicPr>
+            <a:picLocks noChangeAspect="1" noChangeArrowheads="1"/>
+          </p:cNvPicPr>
+          <p:nvPr/>
+        </p:nvPicPr>
+        <p:blipFill>
+          <a:blip r:embed="rId2">
+            <a:extLst>
+              <a:ext uri="{28A0092B-C50C-407E-A947-70E740481C1C}">
+                <a14:useLocalDpi xmlns:a14="http://schemas.microsoft.com/office/drawing/2010/main" val="0"/>
+              </a:ext>
+            </a:extLst>
+          </a:blip>
+          <a:srcRect/>
+          <a:stretch>
+            <a:fillRect/>
+          </a:stretch>
+        </p:blipFill>
+        <p:spPr bwMode="auto">
+          <a:xfrm>
+            <a:off x="5486400" y="2743200"/>
+            <a:ext cx="3200400" cy="3200400"/>
+          </a:xfrm>
+          <a:prstGeom prst="rect">
+            <a:avLst/>
+          </a:prstGeom>
+          <a:noFill/>
+          <a:ln w="9525">
+            <a:solidFill>
+              <a:schemeClr val="tx1"/>
+            </a:solidFill>
+            <a:miter lim="800000"/>
+            <a:headEnd/>
+            <a:tailEnd/>
+          </a:ln>
+          <a:extLst>
+            <a:ext uri="{909E8E84-426E-40DD-AFC4-6F175D3DCCD1}">
+              <a14:hiddenFill xmlns:a14="http://schemas.microsoft.com/office/drawing/2010/main">
+                <a:solidFill>
+                  <a:schemeClr val="accent1"/>
+                </a:solidFill>
+              </a14:hiddenFill>
+            </a:ext>
+          </a:extLst>
+        </p:spPr>
+      </p:pic>
+    </p:spTree>
+    <p:extLst>
+      <p:ext uri="{BB962C8B-B14F-4D97-AF65-F5344CB8AC3E}">
+        <p14:creationId xmlns:p14="http://schemas.microsoft.com/office/powerpoint/2010/main" val="210387210"/>
+      </p:ext>
+    </p:extLst>
+  </p:cSld>
+  <p:clrMapOvr>
+    <a:masterClrMapping/>
+  </p:clrMapOvr>
+  <p:timing>
+    <p:tnLst>
+      <p:par>
+        <p:cTn id="1" dur="indefinite" restart="never" nodeType="tmRoot"/>
+      </p:par>
+    </p:tnLst>
+  </p:timing>
+</p:sld>
+</file>
+
+<file path=ppt/slides/slide28.xml><?xml version="1.0" encoding="utf-8"?>
+<p:sld xmlns:a="http://schemas.openxmlformats.org/drawingml/2006/main" xmlns:r="http://schemas.openxmlformats.org/officeDocument/2006/relationships" xmlns:p="http://schemas.openxmlformats.org/presentationml/2006/main">
+  <p:cSld>
+    <p:spTree>
+      <p:nvGrpSpPr>
+        <p:cNvPr id="1" name=""/>
+        <p:cNvGrpSpPr/>
+        <p:nvPr/>
+      </p:nvGrpSpPr>
+      <p:grpSpPr>
+        <a:xfrm>
+          <a:off x="0" y="0"/>
+          <a:ext cx="0" cy="0"/>
+          <a:chOff x="0" y="0"/>
+          <a:chExt cx="0" cy="0"/>
+        </a:xfrm>
+      </p:grpSpPr>
+      <p:sp>
+        <p:nvSpPr>
+          <p:cNvPr id="2" name="Title 1"/>
+          <p:cNvSpPr>
+            <a:spLocks noGrp="1"/>
+          </p:cNvSpPr>
+          <p:nvPr>
+            <p:ph type="title"/>
+          </p:nvPr>
+        </p:nvSpPr>
+        <p:spPr/>
+        <p:txBody>
+          <a:bodyPr/>
+          <a:lstStyle/>
+          <a:p>
+            <a:r>
+              <a:rPr lang="en-US" dirty="0" smtClean="0"/>
+              <a:t>Make it stop</a:t>
+            </a:r>
+            <a:endParaRPr lang="en-US" dirty="0"/>
+          </a:p>
+        </p:txBody>
+      </p:sp>
+      <p:sp>
+        <p:nvSpPr>
+          <p:cNvPr id="3" name="Content Placeholder 2"/>
+          <p:cNvSpPr>
+            <a:spLocks noGrp="1"/>
+          </p:cNvSpPr>
+          <p:nvPr>
+            <p:ph idx="1"/>
+          </p:nvPr>
+        </p:nvSpPr>
+        <p:spPr/>
+        <p:txBody>
+          <a:bodyPr/>
+          <a:lstStyle/>
+          <a:p>
+            <a:pPr marL="0" indent="0">
+              <a:buNone/>
+            </a:pPr>
+            <a:r>
+              <a:rPr lang="en-US" dirty="0">
+                <a:solidFill>
+                  <a:schemeClr val="accent3"/>
+                </a:solidFill>
+              </a:rPr>
+              <a:t> </a:t>
+            </a:r>
+            <a:r>
+              <a:rPr lang="en-US" dirty="0" err="1">
+                <a:solidFill>
+                  <a:schemeClr val="accent3"/>
+                </a:solidFill>
+              </a:rPr>
+              <a:t>window.setTimeout</a:t>
+            </a:r>
+            <a:r>
+              <a:rPr lang="en-US" dirty="0">
+                <a:solidFill>
+                  <a:schemeClr val="accent3"/>
+                </a:solidFill>
+              </a:rPr>
+              <a:t>(function() {</a:t>
+            </a:r>
+          </a:p>
+          <a:p>
+            <a:pPr marL="0" indent="0">
+              <a:buNone/>
+            </a:pPr>
+            <a:r>
+              <a:rPr lang="en-US" dirty="0">
+                <a:solidFill>
+                  <a:schemeClr val="accent3"/>
+                </a:solidFill>
+              </a:rPr>
+              <a:t>    </a:t>
+            </a:r>
+            <a:r>
+              <a:rPr lang="en-US" dirty="0" err="1">
+                <a:solidFill>
+                  <a:schemeClr val="accent3"/>
+                </a:solidFill>
+              </a:rPr>
+              <a:t>robot.stop</a:t>
+            </a:r>
+            <a:r>
+              <a:rPr lang="en-US" dirty="0">
+                <a:solidFill>
+                  <a:schemeClr val="accent3"/>
+                </a:solidFill>
+              </a:rPr>
+              <a:t>();</a:t>
+            </a:r>
+          </a:p>
+          <a:p>
+            <a:pPr marL="0" indent="0">
+              <a:buNone/>
+            </a:pPr>
+            <a:r>
+              <a:rPr lang="en-US" dirty="0">
+                <a:solidFill>
+                  <a:schemeClr val="accent3"/>
+                </a:solidFill>
+              </a:rPr>
+              <a:t>  }, 4000);</a:t>
+            </a:r>
+          </a:p>
+        </p:txBody>
+      </p:sp>
+      <p:sp>
+        <p:nvSpPr>
+          <p:cNvPr id="4" name="Date Placeholder 3"/>
+          <p:cNvSpPr>
+            <a:spLocks noGrp="1"/>
+          </p:cNvSpPr>
+          <p:nvPr>
+            <p:ph type="dt" sz="half" idx="10"/>
+          </p:nvPr>
+        </p:nvSpPr>
+        <p:spPr/>
+        <p:txBody>
+          <a:bodyPr/>
+          <a:lstStyle/>
+          <a:p>
+            <a:fld id="{1CC94077-FDE3-401A-BCD8-35C08F9C8E9C}" type="datetime1">
+              <a:rPr lang="en-US" smtClean="0"/>
+              <a:t>9/20/2015</a:t>
+            </a:fld>
+            <a:endParaRPr lang="en-US"/>
+          </a:p>
+        </p:txBody>
+      </p:sp>
+      <p:sp>
+        <p:nvSpPr>
+          <p:cNvPr id="5" name="Footer Placeholder 4"/>
+          <p:cNvSpPr>
+            <a:spLocks noGrp="1"/>
+          </p:cNvSpPr>
+          <p:nvPr>
+            <p:ph type="ftr" sz="quarter" idx="11"/>
+          </p:nvPr>
+        </p:nvSpPr>
+        <p:spPr/>
+        <p:txBody>
+          <a:bodyPr/>
+          <a:lstStyle/>
+          <a:p>
+            <a:r>
+              <a:rPr lang="en-US" smtClean="0"/>
+              <a:t>Palle Cogburn, palle@4thex.com</a:t>
+            </a:r>
+            <a:endParaRPr lang="en-US"/>
+          </a:p>
+        </p:txBody>
+      </p:sp>
+      <p:sp>
+        <p:nvSpPr>
+          <p:cNvPr id="6" name="Slide Number Placeholder 5"/>
+          <p:cNvSpPr>
+            <a:spLocks noGrp="1"/>
+          </p:cNvSpPr>
+          <p:nvPr>
+            <p:ph type="sldNum" sz="quarter" idx="12"/>
+          </p:nvPr>
+        </p:nvSpPr>
+        <p:spPr/>
+        <p:txBody>
+          <a:bodyPr/>
+          <a:lstStyle/>
+          <a:p>
+            <a:fld id="{0B3765CF-4554-48AB-8D79-291058ADFA6B}" type="slidenum">
+              <a:rPr lang="en-US" smtClean="0"/>
+              <a:t>28</a:t>
+            </a:fld>
+            <a:endParaRPr lang="en-US"/>
+          </a:p>
+        </p:txBody>
+      </p:sp>
+      <p:pic>
+        <p:nvPicPr>
+          <p:cNvPr id="5122" name="Picture 2"/>
+          <p:cNvPicPr>
+            <a:picLocks noChangeAspect="1" noChangeArrowheads="1"/>
+          </p:cNvPicPr>
+          <p:nvPr/>
+        </p:nvPicPr>
+        <p:blipFill>
+          <a:blip r:embed="rId2">
+            <a:extLst>
+              <a:ext uri="{28A0092B-C50C-407E-A947-70E740481C1C}">
+                <a14:useLocalDpi xmlns:a14="http://schemas.microsoft.com/office/drawing/2010/main" val="0"/>
+              </a:ext>
+            </a:extLst>
+          </a:blip>
+          <a:srcRect/>
+          <a:stretch>
+            <a:fillRect/>
+          </a:stretch>
+        </p:blipFill>
+        <p:spPr bwMode="auto">
+          <a:xfrm>
+            <a:off x="5486400" y="2743200"/>
+            <a:ext cx="3214603" cy="3200400"/>
+          </a:xfrm>
+          <a:prstGeom prst="rect">
+            <a:avLst/>
+          </a:prstGeom>
+          <a:noFill/>
+          <a:ln w="9525">
+            <a:solidFill>
+              <a:schemeClr val="tx1"/>
+            </a:solidFill>
+            <a:miter lim="800000"/>
+            <a:headEnd/>
+            <a:tailEnd/>
+          </a:ln>
+          <a:extLst>
+            <a:ext uri="{909E8E84-426E-40DD-AFC4-6F175D3DCCD1}">
+              <a14:hiddenFill xmlns:a14="http://schemas.microsoft.com/office/drawing/2010/main">
+                <a:solidFill>
+                  <a:schemeClr val="accent1"/>
+                </a:solidFill>
+              </a14:hiddenFill>
+            </a:ext>
+          </a:extLst>
+        </p:spPr>
+      </p:pic>
+    </p:spTree>
+    <p:extLst>
+      <p:ext uri="{BB962C8B-B14F-4D97-AF65-F5344CB8AC3E}">
+        <p14:creationId xmlns:p14="http://schemas.microsoft.com/office/powerpoint/2010/main" val="312823094"/>
+      </p:ext>
+    </p:extLst>
+  </p:cSld>
+  <p:clrMapOvr>
+    <a:masterClrMapping/>
+  </p:clrMapOvr>
+</p:sld>
+</file>
+
+<file path=ppt/slides/slide29.xml><?xml version="1.0" encoding="utf-8"?>
+<p:sld xmlns:a="http://schemas.openxmlformats.org/drawingml/2006/main" xmlns:r="http://schemas.openxmlformats.org/officeDocument/2006/relationships" xmlns:p="http://schemas.openxmlformats.org/presentationml/2006/main">
+  <p:cSld>
+    <p:spTree>
+      <p:nvGrpSpPr>
+        <p:cNvPr id="1" name=""/>
+        <p:cNvGrpSpPr/>
+        <p:nvPr/>
+      </p:nvGrpSpPr>
+      <p:grpSpPr>
+        <a:xfrm>
+          <a:off x="0" y="0"/>
+          <a:ext cx="0" cy="0"/>
+          <a:chOff x="0" y="0"/>
+          <a:chExt cx="0" cy="0"/>
+        </a:xfrm>
+      </p:grpSpPr>
+      <p:sp>
+        <p:nvSpPr>
+          <p:cNvPr id="2" name="Title 1"/>
+          <p:cNvSpPr>
+            <a:spLocks noGrp="1"/>
+          </p:cNvSpPr>
+          <p:nvPr>
+            <p:ph type="title"/>
+          </p:nvPr>
+        </p:nvSpPr>
+        <p:spPr/>
+        <p:txBody>
+          <a:bodyPr/>
+          <a:lstStyle/>
+          <a:p>
+            <a:r>
+              <a:rPr lang="en-US" dirty="0" smtClean="0"/>
+              <a:t>Listen to it</a:t>
+            </a:r>
+            <a:endParaRPr lang="en-US" dirty="0"/>
+          </a:p>
+        </p:txBody>
+      </p:sp>
+      <p:sp>
+        <p:nvSpPr>
+          <p:cNvPr id="3" name="Content Placeholder 2"/>
+          <p:cNvSpPr>
+            <a:spLocks noGrp="1"/>
+          </p:cNvSpPr>
+          <p:nvPr>
+            <p:ph idx="1"/>
+          </p:nvPr>
+        </p:nvSpPr>
+        <p:spPr/>
+        <p:txBody>
+          <a:bodyPr>
+            <a:normAutofit lnSpcReduction="10000"/>
+          </a:bodyPr>
+          <a:lstStyle/>
+          <a:p>
+            <a:pPr marL="0" indent="0">
+              <a:buNone/>
+            </a:pPr>
+            <a:r>
+              <a:rPr lang="en-US" dirty="0" err="1" smtClean="0">
+                <a:solidFill>
+                  <a:schemeClr val="accent3"/>
+                </a:solidFill>
+              </a:rPr>
+              <a:t>robot.onMove</a:t>
+            </a:r>
+            <a:r>
+              <a:rPr lang="en-US" dirty="0" smtClean="0">
+                <a:solidFill>
+                  <a:schemeClr val="accent3"/>
+                </a:solidFill>
+              </a:rPr>
+              <a:t>(function(location</a:t>
+            </a:r>
+            <a:r>
+              <a:rPr lang="en-US" dirty="0">
+                <a:solidFill>
+                  <a:schemeClr val="accent3"/>
+                </a:solidFill>
+              </a:rPr>
+              <a:t>) </a:t>
+            </a:r>
+            <a:r>
+              <a:rPr lang="en-US" dirty="0" smtClean="0">
+                <a:solidFill>
+                  <a:schemeClr val="accent3"/>
+                </a:solidFill>
+              </a:rPr>
+              <a:t>{</a:t>
+            </a:r>
+          </a:p>
+          <a:p>
+            <a:pPr marL="0" indent="0">
+              <a:buNone/>
+            </a:pPr>
+            <a:r>
+              <a:rPr lang="en-US" dirty="0" smtClean="0">
+                <a:solidFill>
+                  <a:schemeClr val="accent3"/>
+                </a:solidFill>
+              </a:rPr>
+              <a:t>// your code here</a:t>
+            </a:r>
+          </a:p>
+          <a:p>
+            <a:pPr marL="0" indent="0">
+              <a:buNone/>
+            </a:pPr>
+            <a:r>
+              <a:rPr lang="en-US" dirty="0" smtClean="0">
+                <a:solidFill>
+                  <a:schemeClr val="accent3"/>
+                </a:solidFill>
+              </a:rPr>
+              <a:t>});</a:t>
+            </a:r>
+          </a:p>
+          <a:p>
+            <a:pPr marL="0" indent="0">
+              <a:buNone/>
+            </a:pPr>
+            <a:r>
+              <a:rPr lang="en-US" dirty="0" smtClean="0"/>
+              <a:t>The location argument is an object:</a:t>
+            </a:r>
+          </a:p>
+          <a:p>
+            <a:pPr marL="0" indent="0">
+              <a:buNone/>
+            </a:pPr>
+            <a:r>
+              <a:rPr lang="en-US" dirty="0" smtClean="0">
+                <a:solidFill>
+                  <a:schemeClr val="accent3"/>
+                </a:solidFill>
+              </a:rPr>
+              <a:t>{</a:t>
+            </a:r>
+          </a:p>
+          <a:p>
+            <a:pPr marL="0" indent="0">
+              <a:buNone/>
+            </a:pPr>
+            <a:r>
+              <a:rPr lang="en-US" dirty="0">
+                <a:solidFill>
+                  <a:schemeClr val="accent3"/>
+                </a:solidFill>
+              </a:rPr>
+              <a:t> </a:t>
+            </a:r>
+            <a:r>
+              <a:rPr lang="en-US" dirty="0" smtClean="0">
+                <a:solidFill>
+                  <a:schemeClr val="accent3"/>
+                </a:solidFill>
+              </a:rPr>
+              <a:t> previous: { x, y, direction},</a:t>
+            </a:r>
+          </a:p>
+          <a:p>
+            <a:pPr marL="0" indent="0">
+              <a:buNone/>
+            </a:pPr>
+            <a:r>
+              <a:rPr lang="en-US" dirty="0" smtClean="0">
+                <a:solidFill>
+                  <a:schemeClr val="accent3"/>
+                </a:solidFill>
+              </a:rPr>
+              <a:t>  current: { x, y, direction}</a:t>
+            </a:r>
+          </a:p>
+          <a:p>
+            <a:pPr marL="0" indent="0">
+              <a:buNone/>
+            </a:pPr>
+            <a:r>
+              <a:rPr lang="en-US" dirty="0" smtClean="0">
+                <a:solidFill>
+                  <a:schemeClr val="accent3"/>
+                </a:solidFill>
+              </a:rPr>
+              <a:t>}</a:t>
+            </a:r>
+            <a:endParaRPr lang="en-US" dirty="0">
+              <a:solidFill>
+                <a:schemeClr val="accent3"/>
+              </a:solidFill>
+            </a:endParaRPr>
+          </a:p>
+        </p:txBody>
+      </p:sp>
+      <p:sp>
+        <p:nvSpPr>
+          <p:cNvPr id="4" name="Date Placeholder 3"/>
+          <p:cNvSpPr>
+            <a:spLocks noGrp="1"/>
+          </p:cNvSpPr>
+          <p:nvPr>
+            <p:ph type="dt" sz="half" idx="10"/>
+          </p:nvPr>
+        </p:nvSpPr>
+        <p:spPr/>
+        <p:txBody>
+          <a:bodyPr/>
+          <a:lstStyle/>
+          <a:p>
+            <a:fld id="{1CC94077-FDE3-401A-BCD8-35C08F9C8E9C}" type="datetime1">
+              <a:rPr lang="en-US" smtClean="0"/>
+              <a:t>9/20/2015</a:t>
+            </a:fld>
+            <a:endParaRPr lang="en-US"/>
+          </a:p>
+        </p:txBody>
+      </p:sp>
+      <p:sp>
+        <p:nvSpPr>
+          <p:cNvPr id="5" name="Footer Placeholder 4"/>
+          <p:cNvSpPr>
+            <a:spLocks noGrp="1"/>
+          </p:cNvSpPr>
+          <p:nvPr>
+            <p:ph type="ftr" sz="quarter" idx="11"/>
+          </p:nvPr>
+        </p:nvSpPr>
+        <p:spPr/>
+        <p:txBody>
+          <a:bodyPr/>
+          <a:lstStyle/>
+          <a:p>
+            <a:r>
+              <a:rPr lang="en-US" smtClean="0"/>
+              <a:t>Palle Cogburn, palle@4thex.com</a:t>
+            </a:r>
+            <a:endParaRPr lang="en-US"/>
+          </a:p>
+        </p:txBody>
+      </p:sp>
+      <p:sp>
+        <p:nvSpPr>
+          <p:cNvPr id="6" name="Slide Number Placeholder 5"/>
+          <p:cNvSpPr>
+            <a:spLocks noGrp="1"/>
+          </p:cNvSpPr>
+          <p:nvPr>
+            <p:ph type="sldNum" sz="quarter" idx="12"/>
+          </p:nvPr>
+        </p:nvSpPr>
+        <p:spPr/>
+        <p:txBody>
+          <a:bodyPr/>
+          <a:lstStyle/>
+          <a:p>
+            <a:fld id="{0B3765CF-4554-48AB-8D79-291058ADFA6B}" type="slidenum">
+              <a:rPr lang="en-US" smtClean="0"/>
+              <a:t>29</a:t>
+            </a:fld>
+            <a:endParaRPr lang="en-US"/>
+          </a:p>
+        </p:txBody>
+      </p:sp>
+    </p:spTree>
+    <p:extLst>
+      <p:ext uri="{BB962C8B-B14F-4D97-AF65-F5344CB8AC3E}">
+        <p14:creationId xmlns:p14="http://schemas.microsoft.com/office/powerpoint/2010/main" val="2465729787"/>
+      </p:ext>
+    </p:extLst>
+  </p:cSld>
+  <p:clrMapOvr>
+    <a:masterClrMapping/>
+  </p:clrMapOvr>
+</p:sld>
+</file>
+
 <file path=ppt/slides/slide3.xml><?xml version="1.0" encoding="utf-8"?>
 <p:sld xmlns:a="http://schemas.openxmlformats.org/drawingml/2006/main" xmlns:r="http://schemas.openxmlformats.org/officeDocument/2006/relationships" xmlns:p="http://schemas.openxmlformats.org/presentationml/2006/main">
   <p:cSld>
@@ -8302,7 +10454,7 @@
           <a:p>
             <a:fld id="{B8B20B94-8863-4C11-BD5B-99AFE2590A93}" type="datetime1">
               <a:rPr lang="en-US" smtClean="0"/>
-              <a:t>9/18/2015</a:t>
+              <a:t>9/20/2015</a:t>
             </a:fld>
             <a:endParaRPr lang="en-US"/>
           </a:p>
@@ -8673,6 +10825,273 @@
 </p:sld>
 </file>
 
+<file path=ppt/slides/slide30.xml><?xml version="1.0" encoding="utf-8"?>
+<p:sld xmlns:a="http://schemas.openxmlformats.org/drawingml/2006/main" xmlns:r="http://schemas.openxmlformats.org/officeDocument/2006/relationships" xmlns:p="http://schemas.openxmlformats.org/presentationml/2006/main">
+  <p:cSld>
+    <p:spTree>
+      <p:nvGrpSpPr>
+        <p:cNvPr id="1" name=""/>
+        <p:cNvGrpSpPr/>
+        <p:nvPr/>
+      </p:nvGrpSpPr>
+      <p:grpSpPr>
+        <a:xfrm>
+          <a:off x="0" y="0"/>
+          <a:ext cx="0" cy="0"/>
+          <a:chOff x="0" y="0"/>
+          <a:chExt cx="0" cy="0"/>
+        </a:xfrm>
+      </p:grpSpPr>
+      <p:sp>
+        <p:nvSpPr>
+          <p:cNvPr id="2" name="Title 1"/>
+          <p:cNvSpPr>
+            <a:spLocks noGrp="1"/>
+          </p:cNvSpPr>
+          <p:nvPr>
+            <p:ph type="title"/>
+          </p:nvPr>
+        </p:nvSpPr>
+        <p:spPr/>
+        <p:txBody>
+          <a:bodyPr/>
+          <a:lstStyle/>
+          <a:p>
+            <a:r>
+              <a:rPr lang="en-US" dirty="0" smtClean="0"/>
+              <a:t>Control it</a:t>
+            </a:r>
+            <a:endParaRPr lang="en-US" dirty="0"/>
+          </a:p>
+        </p:txBody>
+      </p:sp>
+      <p:sp>
+        <p:nvSpPr>
+          <p:cNvPr id="3" name="Content Placeholder 2"/>
+          <p:cNvSpPr>
+            <a:spLocks noGrp="1"/>
+          </p:cNvSpPr>
+          <p:nvPr>
+            <p:ph idx="1"/>
+          </p:nvPr>
+        </p:nvSpPr>
+        <p:spPr/>
+        <p:txBody>
+          <a:bodyPr/>
+          <a:lstStyle/>
+          <a:p>
+            <a:pPr marL="0" indent="0">
+              <a:buNone/>
+            </a:pPr>
+            <a:r>
+              <a:rPr lang="en-US" dirty="0" smtClean="0"/>
+              <a:t>Use the </a:t>
+            </a:r>
+            <a:r>
+              <a:rPr lang="en-US" dirty="0" err="1" smtClean="0">
+                <a:solidFill>
+                  <a:schemeClr val="accent3"/>
+                </a:solidFill>
+              </a:rPr>
+              <a:t>onMove</a:t>
+            </a:r>
+            <a:r>
+              <a:rPr lang="en-US" dirty="0" smtClean="0">
+                <a:solidFill>
+                  <a:schemeClr val="accent3"/>
+                </a:solidFill>
+              </a:rPr>
+              <a:t> </a:t>
+            </a:r>
+            <a:r>
+              <a:rPr lang="en-US" dirty="0" smtClean="0"/>
+              <a:t>method to make the robot stop when it reaches </a:t>
+            </a:r>
+            <a:r>
+              <a:rPr lang="en-US" dirty="0" smtClean="0">
+                <a:solidFill>
+                  <a:schemeClr val="accent3"/>
+                </a:solidFill>
+              </a:rPr>
+              <a:t>y</a:t>
+            </a:r>
+            <a:r>
+              <a:rPr lang="en-US" dirty="0" smtClean="0"/>
+              <a:t> &gt; 400.</a:t>
+            </a:r>
+          </a:p>
+          <a:p>
+            <a:pPr marL="0" indent="0">
+              <a:buNone/>
+            </a:pPr>
+            <a:r>
+              <a:rPr lang="en-US" dirty="0" smtClean="0"/>
+              <a:t>Use a condition, and the </a:t>
+            </a:r>
+            <a:r>
+              <a:rPr lang="en-US" dirty="0" smtClean="0">
+                <a:solidFill>
+                  <a:schemeClr val="accent3"/>
+                </a:solidFill>
+              </a:rPr>
+              <a:t>if</a:t>
+            </a:r>
+            <a:r>
+              <a:rPr lang="en-US" dirty="0"/>
+              <a:t>-</a:t>
+            </a:r>
+            <a:r>
+              <a:rPr lang="en-US" dirty="0" smtClean="0"/>
+              <a:t>statement.</a:t>
+            </a:r>
+          </a:p>
+          <a:p>
+            <a:pPr marL="0" indent="0">
+              <a:buNone/>
+            </a:pPr>
+            <a:r>
+              <a:rPr lang="en-US" dirty="0" smtClean="0">
+                <a:solidFill>
+                  <a:schemeClr val="accent3"/>
+                </a:solidFill>
+              </a:rPr>
+              <a:t>if(y &gt; 400) {</a:t>
+            </a:r>
+          </a:p>
+          <a:p>
+            <a:pPr marL="0" indent="0">
+              <a:buNone/>
+            </a:pPr>
+            <a:r>
+              <a:rPr lang="en-US" dirty="0">
+                <a:solidFill>
+                  <a:schemeClr val="accent3"/>
+                </a:solidFill>
+              </a:rPr>
+              <a:t> </a:t>
+            </a:r>
+            <a:r>
+              <a:rPr lang="en-US" dirty="0" smtClean="0">
+                <a:solidFill>
+                  <a:schemeClr val="accent3"/>
+                </a:solidFill>
+              </a:rPr>
+              <a:t> </a:t>
+            </a:r>
+            <a:r>
+              <a:rPr lang="en-US" dirty="0" err="1" smtClean="0">
+                <a:solidFill>
+                  <a:schemeClr val="accent3"/>
+                </a:solidFill>
+              </a:rPr>
+              <a:t>robot.stop</a:t>
+            </a:r>
+            <a:r>
+              <a:rPr lang="en-US" dirty="0" smtClean="0">
+                <a:solidFill>
+                  <a:schemeClr val="accent3"/>
+                </a:solidFill>
+              </a:rPr>
+              <a:t>();</a:t>
+            </a:r>
+          </a:p>
+          <a:p>
+            <a:pPr marL="0" indent="0">
+              <a:buNone/>
+            </a:pPr>
+            <a:r>
+              <a:rPr lang="en-US" dirty="0">
+                <a:solidFill>
+                  <a:schemeClr val="accent3"/>
+                </a:solidFill>
+              </a:rPr>
+              <a:t>}</a:t>
+            </a:r>
+          </a:p>
+        </p:txBody>
+      </p:sp>
+      <p:sp>
+        <p:nvSpPr>
+          <p:cNvPr id="4" name="Date Placeholder 3"/>
+          <p:cNvSpPr>
+            <a:spLocks noGrp="1"/>
+          </p:cNvSpPr>
+          <p:nvPr>
+            <p:ph type="dt" sz="half" idx="10"/>
+          </p:nvPr>
+        </p:nvSpPr>
+        <p:spPr/>
+        <p:txBody>
+          <a:bodyPr/>
+          <a:lstStyle/>
+          <a:p>
+            <a:fld id="{1CC94077-FDE3-401A-BCD8-35C08F9C8E9C}" type="datetime1">
+              <a:rPr lang="en-US" smtClean="0"/>
+              <a:t>9/20/2015</a:t>
+            </a:fld>
+            <a:endParaRPr lang="en-US"/>
+          </a:p>
+        </p:txBody>
+      </p:sp>
+      <p:sp>
+        <p:nvSpPr>
+          <p:cNvPr id="5" name="Footer Placeholder 4"/>
+          <p:cNvSpPr>
+            <a:spLocks noGrp="1"/>
+          </p:cNvSpPr>
+          <p:nvPr>
+            <p:ph type="ftr" sz="quarter" idx="11"/>
+          </p:nvPr>
+        </p:nvSpPr>
+        <p:spPr/>
+        <p:txBody>
+          <a:bodyPr/>
+          <a:lstStyle/>
+          <a:p>
+            <a:r>
+              <a:rPr lang="en-US" smtClean="0"/>
+              <a:t>Palle Cogburn, palle@4thex.com</a:t>
+            </a:r>
+            <a:endParaRPr lang="en-US"/>
+          </a:p>
+        </p:txBody>
+      </p:sp>
+      <p:sp>
+        <p:nvSpPr>
+          <p:cNvPr id="6" name="Slide Number Placeholder 5"/>
+          <p:cNvSpPr>
+            <a:spLocks noGrp="1"/>
+          </p:cNvSpPr>
+          <p:nvPr>
+            <p:ph type="sldNum" sz="quarter" idx="12"/>
+          </p:nvPr>
+        </p:nvSpPr>
+        <p:spPr/>
+        <p:txBody>
+          <a:bodyPr/>
+          <a:lstStyle/>
+          <a:p>
+            <a:fld id="{0B3765CF-4554-48AB-8D79-291058ADFA6B}" type="slidenum">
+              <a:rPr lang="en-US" smtClean="0"/>
+              <a:t>30</a:t>
+            </a:fld>
+            <a:endParaRPr lang="en-US"/>
+          </a:p>
+        </p:txBody>
+      </p:sp>
+    </p:spTree>
+    <p:extLst>
+      <p:ext uri="{BB962C8B-B14F-4D97-AF65-F5344CB8AC3E}">
+        <p14:creationId xmlns:p14="http://schemas.microsoft.com/office/powerpoint/2010/main" val="3916285064"/>
+      </p:ext>
+    </p:extLst>
+  </p:cSld>
+  <p:clrMapOvr>
+    <a:masterClrMapping/>
+  </p:clrMapOvr>
+</p:sld>
+</file>
+
 <file path=ppt/slides/slide4.xml><?xml version="1.0" encoding="utf-8"?>
 <p:sld xmlns:a="http://schemas.openxmlformats.org/drawingml/2006/main" xmlns:r="http://schemas.openxmlformats.org/officeDocument/2006/relationships" xmlns:p="http://schemas.openxmlformats.org/presentationml/2006/main">
   <p:cSld>
@@ -8805,7 +11224,7 @@
           <a:p>
             <a:fld id="{B8B20B94-8863-4C11-BD5B-99AFE2590A93}" type="datetime1">
               <a:rPr lang="en-US" smtClean="0"/>
-              <a:t>9/18/2015</a:t>
+              <a:t>9/20/2015</a:t>
             </a:fld>
             <a:endParaRPr lang="en-US"/>
           </a:p>
@@ -9379,7 +11798,7 @@
           <a:p>
             <a:fld id="{E945FFF6-7B56-4A06-A3D0-DFA9EB3EBC1D}" type="datetime1">
               <a:rPr lang="en-US" smtClean="0"/>
-              <a:t>9/18/2015</a:t>
+              <a:t>9/20/2015</a:t>
             </a:fld>
             <a:endParaRPr lang="en-US"/>
           </a:p>
@@ -9624,7 +12043,7 @@
           <a:p>
             <a:fld id="{CE778B27-C4F3-4FD3-A6BB-1E8866B655A8}" type="datetime1">
               <a:rPr lang="en-US" smtClean="0"/>
-              <a:t>9/18/2015</a:t>
+              <a:t>9/20/2015</a:t>
             </a:fld>
             <a:endParaRPr lang="en-US"/>
           </a:p>
@@ -10627,7 +13046,7 @@
           <a:p>
             <a:fld id="{6B9B7572-2EDC-4669-B3CE-54BED61294D5}" type="datetime1">
               <a:rPr lang="en-US" smtClean="0"/>
-              <a:t>9/18/2015</a:t>
+              <a:t>9/20/2015</a:t>
             </a:fld>
             <a:endParaRPr lang="en-US"/>
           </a:p>
@@ -11139,7 +13558,7 @@
           <a:p>
             <a:fld id="{95E3B975-9400-45B6-B8DD-72FA0247083D}" type="datetime1">
               <a:rPr lang="en-US" smtClean="0"/>
-              <a:t>9/18/2015</a:t>
+              <a:t>9/20/2015</a:t>
             </a:fld>
             <a:endParaRPr lang="en-US"/>
           </a:p>
@@ -11356,7 +13775,7 @@
           <a:p>
             <a:fld id="{11009266-8731-4561-A05C-81C9673AD39F}" type="datetime1">
               <a:rPr lang="en-US" smtClean="0"/>
-              <a:t>9/18/2015</a:t>
+              <a:t>9/20/2015</a:t>
             </a:fld>
             <a:endParaRPr lang="en-US"/>
           </a:p>

</xml_diff>

<commit_message>
Added a new quiz, and more slides
</commit_message>
<xml_diff>
--- a/doc/Computer Programming 1.pptx
+++ b/doc/Computer Programming 1.pptx
@@ -7,6 +7,9 @@
   <p:notesMasterIdLst>
     <p:notesMasterId r:id="rId41"/>
   </p:notesMasterIdLst>
+  <p:handoutMasterIdLst>
+    <p:handoutMasterId r:id="rId42"/>
+  </p:handoutMasterIdLst>
   <p:sldIdLst>
     <p:sldId id="256" r:id="rId2"/>
     <p:sldId id="275" r:id="rId3"/>
@@ -49,7 +52,7 @@
     <p:sldId id="286" r:id="rId40"/>
   </p:sldIdLst>
   <p:sldSz cx="9144000" cy="6858000" type="screen4x3"/>
-  <p:notesSz cx="6858000" cy="9144000"/>
+  <p:notesSz cx="7077075" cy="9051925"/>
   <p:defaultTextStyle>
     <a:defPPr>
       <a:defRPr lang="en-US"/>
@@ -147,7 +150,7 @@
   </p:defaultTextStyle>
   <p:extLst>
     <p:ext uri="{EFAFB233-063F-42B5-8137-9DF3F51BA10A}">
-      <p15:sldGuideLst xmlns="" xmlns:p15="http://schemas.microsoft.com/office/powerpoint/2012/main">
+      <p15:sldGuideLst xmlns:p15="http://schemas.microsoft.com/office/powerpoint/2012/main" xmlns="">
         <p15:guide id="1" orient="horz" pos="2160">
           <p15:clr>
             <a:srgbClr val="A4A3A4"/>
@@ -162,6 +165,171 @@
     </p:ext>
   </p:extLst>
 </p:presentation>
+</file>
+
+<file path=ppt/handoutMasters/handoutMaster1.xml><?xml version="1.0" encoding="utf-8"?>
+<p:handoutMaster xmlns:a="http://schemas.openxmlformats.org/drawingml/2006/main" xmlns:r="http://schemas.openxmlformats.org/officeDocument/2006/relationships" xmlns:p="http://schemas.openxmlformats.org/presentationml/2006/main">
+  <p:cSld>
+    <p:bg>
+      <p:bgRef idx="1001">
+        <a:schemeClr val="bg1"/>
+      </p:bgRef>
+    </p:bg>
+    <p:spTree>
+      <p:nvGrpSpPr>
+        <p:cNvPr id="1" name=""/>
+        <p:cNvGrpSpPr/>
+        <p:nvPr/>
+      </p:nvGrpSpPr>
+      <p:grpSpPr>
+        <a:xfrm>
+          <a:off x="0" y="0"/>
+          <a:ext cx="0" cy="0"/>
+          <a:chOff x="0" y="0"/>
+          <a:chExt cx="0" cy="0"/>
+        </a:xfrm>
+      </p:grpSpPr>
+      <p:sp>
+        <p:nvSpPr>
+          <p:cNvPr id="2" name="Header Placeholder 1"/>
+          <p:cNvSpPr>
+            <a:spLocks noGrp="1"/>
+          </p:cNvSpPr>
+          <p:nvPr>
+            <p:ph type="hdr" sz="quarter"/>
+          </p:nvPr>
+        </p:nvSpPr>
+        <p:spPr>
+          <a:xfrm>
+            <a:off x="0" y="0"/>
+            <a:ext cx="3066733" cy="452596"/>
+          </a:xfrm>
+          <a:prstGeom prst="rect">
+            <a:avLst/>
+          </a:prstGeom>
+        </p:spPr>
+        <p:txBody>
+          <a:bodyPr vert="horz" lIns="91440" tIns="45720" rIns="91440" bIns="45720" rtlCol="0"/>
+          <a:lstStyle>
+            <a:lvl1pPr algn="l">
+              <a:defRPr sz="1200"/>
+            </a:lvl1pPr>
+          </a:lstStyle>
+          <a:p>
+            <a:endParaRPr lang="en-US"/>
+          </a:p>
+        </p:txBody>
+      </p:sp>
+      <p:sp>
+        <p:nvSpPr>
+          <p:cNvPr id="3" name="Date Placeholder 2"/>
+          <p:cNvSpPr>
+            <a:spLocks noGrp="1"/>
+          </p:cNvSpPr>
+          <p:nvPr>
+            <p:ph type="dt" sz="quarter" idx="1"/>
+          </p:nvPr>
+        </p:nvSpPr>
+        <p:spPr>
+          <a:xfrm>
+            <a:off x="4008705" y="0"/>
+            <a:ext cx="3066733" cy="452596"/>
+          </a:xfrm>
+          <a:prstGeom prst="rect">
+            <a:avLst/>
+          </a:prstGeom>
+        </p:spPr>
+        <p:txBody>
+          <a:bodyPr vert="horz" lIns="91440" tIns="45720" rIns="91440" bIns="45720" rtlCol="0"/>
+          <a:lstStyle>
+            <a:lvl1pPr algn="r">
+              <a:defRPr sz="1200"/>
+            </a:lvl1pPr>
+          </a:lstStyle>
+          <a:p>
+            <a:fld id="{7CEFD2EB-0656-418F-80E3-FE7FD75401D5}" type="datetimeFigureOut">
+              <a:rPr lang="en-US" smtClean="0"/>
+              <a:t>9/25/2015</a:t>
+            </a:fld>
+            <a:endParaRPr lang="en-US"/>
+          </a:p>
+        </p:txBody>
+      </p:sp>
+      <p:sp>
+        <p:nvSpPr>
+          <p:cNvPr id="4" name="Footer Placeholder 3"/>
+          <p:cNvSpPr>
+            <a:spLocks noGrp="1"/>
+          </p:cNvSpPr>
+          <p:nvPr>
+            <p:ph type="ftr" sz="quarter" idx="2"/>
+          </p:nvPr>
+        </p:nvSpPr>
+        <p:spPr>
+          <a:xfrm>
+            <a:off x="0" y="8597758"/>
+            <a:ext cx="3066733" cy="452596"/>
+          </a:xfrm>
+          <a:prstGeom prst="rect">
+            <a:avLst/>
+          </a:prstGeom>
+        </p:spPr>
+        <p:txBody>
+          <a:bodyPr vert="horz" lIns="91440" tIns="45720" rIns="91440" bIns="45720" rtlCol="0" anchor="b"/>
+          <a:lstStyle>
+            <a:lvl1pPr algn="l">
+              <a:defRPr sz="1200"/>
+            </a:lvl1pPr>
+          </a:lstStyle>
+          <a:p>
+            <a:endParaRPr lang="en-US"/>
+          </a:p>
+        </p:txBody>
+      </p:sp>
+      <p:sp>
+        <p:nvSpPr>
+          <p:cNvPr id="5" name="Slide Number Placeholder 4"/>
+          <p:cNvSpPr>
+            <a:spLocks noGrp="1"/>
+          </p:cNvSpPr>
+          <p:nvPr>
+            <p:ph type="sldNum" sz="quarter" idx="3"/>
+          </p:nvPr>
+        </p:nvSpPr>
+        <p:spPr>
+          <a:xfrm>
+            <a:off x="4008705" y="8597758"/>
+            <a:ext cx="3066733" cy="452596"/>
+          </a:xfrm>
+          <a:prstGeom prst="rect">
+            <a:avLst/>
+          </a:prstGeom>
+        </p:spPr>
+        <p:txBody>
+          <a:bodyPr vert="horz" lIns="91440" tIns="45720" rIns="91440" bIns="45720" rtlCol="0" anchor="b"/>
+          <a:lstStyle>
+            <a:lvl1pPr algn="r">
+              <a:defRPr sz="1200"/>
+            </a:lvl1pPr>
+          </a:lstStyle>
+          <a:p>
+            <a:fld id="{51BE6A9C-DBD2-4720-BC2F-D89BFA43220F}" type="slidenum">
+              <a:rPr lang="en-US" smtClean="0"/>
+              <a:t>‹#›</a:t>
+            </a:fld>
+            <a:endParaRPr lang="en-US"/>
+          </a:p>
+        </p:txBody>
+      </p:sp>
+    </p:spTree>
+    <p:extLst>
+      <p:ext uri="{BB962C8B-B14F-4D97-AF65-F5344CB8AC3E}">
+        <p14:creationId xmlns:p14="http://schemas.microsoft.com/office/powerpoint/2010/main" val="1578039949"/>
+      </p:ext>
+    </p:extLst>
+  </p:cSld>
+  <p:clrMap bg1="lt1" tx1="dk1" bg2="lt2" tx2="dk2" accent1="accent1" accent2="accent2" accent3="accent3" accent4="accent4" accent5="accent5" accent6="accent6" hlink="hlink" folHlink="folHlink"/>
+</p:handoutMaster>
 </file>
 
 <file path=ppt/notesMasters/notesMaster1.xml><?xml version="1.0" encoding="utf-8"?>
@@ -199,7 +367,7 @@
         <p:spPr>
           <a:xfrm>
             <a:off x="0" y="0"/>
-            <a:ext cx="2971800" cy="457200"/>
+            <a:ext cx="3066733" cy="452596"/>
           </a:xfrm>
           <a:prstGeom prst="rect">
             <a:avLst/>
@@ -229,8 +397,8 @@
         </p:nvSpPr>
         <p:spPr>
           <a:xfrm>
-            <a:off x="3884613" y="0"/>
-            <a:ext cx="2971800" cy="457200"/>
+            <a:off x="4008705" y="0"/>
+            <a:ext cx="3066733" cy="452596"/>
           </a:xfrm>
           <a:prstGeom prst="rect">
             <a:avLst/>
@@ -246,7 +414,7 @@
           <a:p>
             <a:fld id="{AC3BB2AB-7E53-4444-A9AA-484976F48190}" type="datetimeFigureOut">
               <a:rPr lang="en-US" smtClean="0"/>
-              <a:t>9/21/2015</a:t>
+              <a:t>9/25/2015</a:t>
             </a:fld>
             <a:endParaRPr lang="en-US"/>
           </a:p>
@@ -264,8 +432,8 @@
         </p:nvSpPr>
         <p:spPr>
           <a:xfrm>
-            <a:off x="1143000" y="685800"/>
-            <a:ext cx="4572000" cy="3429000"/>
+            <a:off x="1276350" y="679450"/>
+            <a:ext cx="4524375" cy="3394075"/>
           </a:xfrm>
           <a:prstGeom prst="rect">
             <a:avLst/>
@@ -297,8 +465,8 @@
         </p:nvSpPr>
         <p:spPr>
           <a:xfrm>
-            <a:off x="685800" y="4343400"/>
-            <a:ext cx="5486400" cy="4114800"/>
+            <a:off x="707708" y="4299665"/>
+            <a:ext cx="5661660" cy="4073366"/>
           </a:xfrm>
           <a:prstGeom prst="rect">
             <a:avLst/>
@@ -357,8 +525,8 @@
         </p:nvSpPr>
         <p:spPr>
           <a:xfrm>
-            <a:off x="0" y="8685213"/>
-            <a:ext cx="2971800" cy="457200"/>
+            <a:off x="0" y="8597758"/>
+            <a:ext cx="3066733" cy="452596"/>
           </a:xfrm>
           <a:prstGeom prst="rect">
             <a:avLst/>
@@ -388,8 +556,8 @@
         </p:nvSpPr>
         <p:spPr>
           <a:xfrm>
-            <a:off x="3884613" y="8685213"/>
-            <a:ext cx="2971800" cy="457200"/>
+            <a:off x="4008705" y="8597758"/>
+            <a:ext cx="3066733" cy="452596"/>
           </a:xfrm>
           <a:prstGeom prst="rect">
             <a:avLst/>
@@ -951,7 +1119,7 @@
           <a:p>
             <a:fld id="{E48118A4-110A-4925-9333-BC5A7FDABDA6}" type="datetime1">
               <a:rPr lang="en-US" smtClean="0"/>
-              <a:t>9/21/2015</a:t>
+              <a:t>9/25/2015</a:t>
             </a:fld>
             <a:endParaRPr lang="en-US"/>
           </a:p>
@@ -1186,7 +1354,7 @@
           <a:p>
             <a:fld id="{0A2E4327-6481-4226-A82C-E682EA4A35CC}" type="datetime1">
               <a:rPr lang="en-US" smtClean="0"/>
-              <a:t>9/21/2015</a:t>
+              <a:t>9/25/2015</a:t>
             </a:fld>
             <a:endParaRPr lang="en-US"/>
           </a:p>
@@ -1377,7 +1545,7 @@
           <a:p>
             <a:fld id="{E2D702B0-E00D-4C98-9C46-5C4CB5F093B0}" type="datetime1">
               <a:rPr lang="en-US" smtClean="0"/>
-              <a:t>9/21/2015</a:t>
+              <a:t>9/25/2015</a:t>
             </a:fld>
             <a:endParaRPr lang="en-US"/>
           </a:p>
@@ -1571,7 +1739,7 @@
           <a:p>
             <a:fld id="{1CC94077-FDE3-401A-BCD8-35C08F9C8E9C}" type="datetime1">
               <a:rPr lang="en-US" smtClean="0"/>
-              <a:t>9/21/2015</a:t>
+              <a:t>9/25/2015</a:t>
             </a:fld>
             <a:endParaRPr lang="en-US"/>
           </a:p>
@@ -1828,7 +1996,7 @@
           <a:p>
             <a:fld id="{1B40FCA3-EDB1-48B8-86CC-B4143E849120}" type="datetime1">
               <a:rPr lang="en-US" smtClean="0"/>
-              <a:t>9/21/2015</a:t>
+              <a:t>9/25/2015</a:t>
             </a:fld>
             <a:endParaRPr lang="en-US"/>
           </a:p>
@@ -2127,7 +2295,7 @@
           <a:p>
             <a:fld id="{D349E218-273A-4075-9C9D-22197EABA91B}" type="datetime1">
               <a:rPr lang="en-US" smtClean="0"/>
-              <a:t>9/21/2015</a:t>
+              <a:t>9/25/2015</a:t>
             </a:fld>
             <a:endParaRPr lang="en-US"/>
           </a:p>
@@ -2560,7 +2728,7 @@
           <a:p>
             <a:fld id="{B8B20B94-8863-4C11-BD5B-99AFE2590A93}" type="datetime1">
               <a:rPr lang="en-US" smtClean="0"/>
-              <a:t>9/21/2015</a:t>
+              <a:t>9/25/2015</a:t>
             </a:fld>
             <a:endParaRPr lang="en-US"/>
           </a:p>
@@ -2689,7 +2857,7 @@
           <a:p>
             <a:fld id="{3982EF56-2C12-43BA-B511-8155CE4B5F26}" type="datetime1">
               <a:rPr lang="en-US" smtClean="0"/>
-              <a:t>9/21/2015</a:t>
+              <a:t>9/25/2015</a:t>
             </a:fld>
             <a:endParaRPr lang="en-US"/>
           </a:p>
@@ -2795,7 +2963,7 @@
           <a:p>
             <a:fld id="{67B73BE6-683B-480E-BD58-7F6BEA0B7BD5}" type="datetime1">
               <a:rPr lang="en-US" smtClean="0"/>
-              <a:t>9/21/2015</a:t>
+              <a:t>9/25/2015</a:t>
             </a:fld>
             <a:endParaRPr lang="en-US"/>
           </a:p>
@@ -3083,7 +3251,7 @@
           <a:p>
             <a:fld id="{45AD249F-C4CE-406B-B40A-9F02EDC68302}" type="datetime1">
               <a:rPr lang="en-US" smtClean="0"/>
-              <a:t>9/21/2015</a:t>
+              <a:t>9/25/2015</a:t>
             </a:fld>
             <a:endParaRPr lang="en-US"/>
           </a:p>
@@ -3347,7 +3515,7 @@
           <a:p>
             <a:fld id="{D56D8053-4F23-4744-B7EF-88442188BCEC}" type="datetime1">
               <a:rPr lang="en-US" smtClean="0"/>
-              <a:t>9/21/2015</a:t>
+              <a:t>9/25/2015</a:t>
             </a:fld>
             <a:endParaRPr lang="en-US"/>
           </a:p>
@@ -3571,7 +3739,7 @@
           <a:p>
             <a:fld id="{64B11703-DF0D-4969-ACC9-C9FEC18DE100}" type="datetime1">
               <a:rPr lang="en-US" smtClean="0"/>
-              <a:t>9/21/2015</a:t>
+              <a:t>9/25/2015</a:t>
             </a:fld>
             <a:endParaRPr lang="en-US"/>
           </a:p>
@@ -4127,7 +4295,7 @@
           <a:p>
             <a:fld id="{3C881C21-AB30-4CB8-B358-F525BEAB214D}" type="datetime1">
               <a:rPr lang="en-US" smtClean="0"/>
-              <a:t>9/21/2015</a:t>
+              <a:t>9/25/2015</a:t>
             </a:fld>
             <a:endParaRPr lang="en-US"/>
           </a:p>
@@ -4413,7 +4581,7 @@
           <a:p>
             <a:fld id="{FDAA5173-8692-49D9-B287-93D52240196C}" type="datetime1">
               <a:rPr lang="en-US" smtClean="0"/>
-              <a:t>9/21/2015</a:t>
+              <a:t>9/25/2015</a:t>
             </a:fld>
             <a:endParaRPr lang="en-US"/>
           </a:p>
@@ -4714,7 +4882,7 @@
           <a:p>
             <a:fld id="{24B64F5A-C452-4B2C-A2B8-1DD3D2201569}" type="datetime1">
               <a:rPr lang="en-US" smtClean="0"/>
-              <a:t>9/21/2015</a:t>
+              <a:t>9/25/2015</a:t>
             </a:fld>
             <a:endParaRPr lang="en-US"/>
           </a:p>
@@ -5102,7 +5270,7 @@
           <a:p>
             <a:fld id="{E6687B95-F2AA-43BE-A1DF-C9C496EF8DD3}" type="datetime1">
               <a:rPr lang="en-US" smtClean="0"/>
-              <a:t>9/21/2015</a:t>
+              <a:t>9/25/2015</a:t>
             </a:fld>
             <a:endParaRPr lang="en-US"/>
           </a:p>
@@ -5502,7 +5670,7 @@
           <a:p>
             <a:fld id="{046F1FCF-F06B-4D07-A3E4-75BF796AD2D8}" type="datetime1">
               <a:rPr lang="en-US" smtClean="0"/>
-              <a:t>9/21/2015</a:t>
+              <a:t>9/25/2015</a:t>
             </a:fld>
             <a:endParaRPr lang="en-US"/>
           </a:p>
@@ -5744,7 +5912,7 @@
           <a:p>
             <a:fld id="{CCE2C4C2-3D09-49AC-B2B9-F32567B8319A}" type="datetime1">
               <a:rPr lang="en-US" smtClean="0"/>
-              <a:t>9/21/2015</a:t>
+              <a:t>9/25/2015</a:t>
             </a:fld>
             <a:endParaRPr lang="en-US"/>
           </a:p>
@@ -5999,7 +6167,7 @@
           <a:p>
             <a:fld id="{1CC94077-FDE3-401A-BCD8-35C08F9C8E9C}" type="datetime1">
               <a:rPr lang="en-US" smtClean="0"/>
-              <a:t>9/21/2015</a:t>
+              <a:t>9/25/2015</a:t>
             </a:fld>
             <a:endParaRPr lang="en-US" dirty="0"/>
           </a:p>
@@ -6259,7 +6427,7 @@
           <a:p>
             <a:fld id="{1CC94077-FDE3-401A-BCD8-35C08F9C8E9C}" type="datetime1">
               <a:rPr lang="en-US" smtClean="0"/>
-              <a:t>9/21/2015</a:t>
+              <a:t>9/25/2015</a:t>
             </a:fld>
             <a:endParaRPr lang="en-US"/>
           </a:p>
@@ -6574,7 +6742,7 @@
           <a:p>
             <a:fld id="{1CC94077-FDE3-401A-BCD8-35C08F9C8E9C}" type="datetime1">
               <a:rPr lang="en-US" smtClean="0"/>
-              <a:t>9/21/2015</a:t>
+              <a:t>9/25/2015</a:t>
             </a:fld>
             <a:endParaRPr lang="en-US"/>
           </a:p>
@@ -6883,7 +7051,7 @@
           <a:p>
             <a:fld id="{1CC94077-FDE3-401A-BCD8-35C08F9C8E9C}" type="datetime1">
               <a:rPr lang="en-US" smtClean="0"/>
-              <a:t>9/21/2015</a:t>
+              <a:t>9/25/2015</a:t>
             </a:fld>
             <a:endParaRPr lang="en-US"/>
           </a:p>
@@ -7336,7 +7504,7 @@
           <a:p>
             <a:fld id="{1CC94077-FDE3-401A-BCD8-35C08F9C8E9C}" type="datetime1">
               <a:rPr lang="en-US" smtClean="0"/>
-              <a:t>9/21/2015</a:t>
+              <a:t>9/25/2015</a:t>
             </a:fld>
             <a:endParaRPr lang="en-US"/>
           </a:p>
@@ -7621,7 +7789,7 @@
           <a:p>
             <a:fld id="{B8B20B94-8863-4C11-BD5B-99AFE2590A93}" type="datetime1">
               <a:rPr lang="en-US" smtClean="0"/>
-              <a:t>9/21/2015</a:t>
+              <a:t>9/25/2015</a:t>
             </a:fld>
             <a:endParaRPr lang="en-US"/>
           </a:p>
@@ -8008,17 +8176,7 @@
                 <a:latin typeface="Consolas" panose="020B0609020204030204" pitchFamily="49" charset="0"/>
                 <a:cs typeface="Consolas" panose="020B0609020204030204" pitchFamily="49" charset="0"/>
               </a:rPr>
-              <a:t>it</a:t>
-            </a:r>
-            <a:r>
-              <a:rPr lang="en-US" dirty="0" err="1" smtClean="0">
-                <a:solidFill>
-                  <a:schemeClr val="accent3"/>
-                </a:solidFill>
-                <a:latin typeface="Consolas" panose="020B0609020204030204" pitchFamily="49" charset="0"/>
-                <a:cs typeface="Consolas" panose="020B0609020204030204" pitchFamily="49" charset="0"/>
-              </a:rPr>
-              <a:t>.pop</a:t>
+              <a:t>it.pop</a:t>
             </a:r>
             <a:r>
               <a:rPr lang="en-US" dirty="0" smtClean="0">
@@ -8209,7 +8367,7 @@
           <a:p>
             <a:fld id="{1CC94077-FDE3-401A-BCD8-35C08F9C8E9C}" type="datetime1">
               <a:rPr lang="en-US" smtClean="0"/>
-              <a:t>9/21/2015</a:t>
+              <a:t>9/25/2015</a:t>
             </a:fld>
             <a:endParaRPr lang="en-US"/>
           </a:p>
@@ -8366,7 +8524,7 @@
           <a:p>
             <a:fld id="{1CC94077-FDE3-401A-BCD8-35C08F9C8E9C}" type="datetime1">
               <a:rPr lang="en-US" smtClean="0"/>
-              <a:t>9/21/2015</a:t>
+              <a:t>9/25/2015</a:t>
             </a:fld>
             <a:endParaRPr lang="en-US"/>
           </a:p>
@@ -8617,7 +8775,7 @@
           <a:p>
             <a:fld id="{1CC94077-FDE3-401A-BCD8-35C08F9C8E9C}" type="datetime1">
               <a:rPr lang="en-US" smtClean="0"/>
-              <a:t>9/21/2015</a:t>
+              <a:t>9/25/2015</a:t>
             </a:fld>
             <a:endParaRPr lang="en-US"/>
           </a:p>
@@ -8924,7 +9082,7 @@
           <a:p>
             <a:fld id="{1CC94077-FDE3-401A-BCD8-35C08F9C8E9C}" type="datetime1">
               <a:rPr lang="en-US" smtClean="0"/>
-              <a:t>9/21/2015</a:t>
+              <a:t>9/25/2015</a:t>
             </a:fld>
             <a:endParaRPr lang="en-US"/>
           </a:p>
@@ -9361,7 +9519,7 @@
           <a:p>
             <a:fld id="{1CC94077-FDE3-401A-BCD8-35C08F9C8E9C}" type="datetime1">
               <a:rPr lang="en-US" smtClean="0"/>
-              <a:t>9/21/2015</a:t>
+              <a:t>9/25/2015</a:t>
             </a:fld>
             <a:endParaRPr lang="en-US"/>
           </a:p>
@@ -9772,7 +9930,7 @@
           <a:p>
             <a:fld id="{1CC94077-FDE3-401A-BCD8-35C08F9C8E9C}" type="datetime1">
               <a:rPr lang="en-US" smtClean="0"/>
-              <a:t>9/21/2015</a:t>
+              <a:t>9/25/2015</a:t>
             </a:fld>
             <a:endParaRPr lang="en-US"/>
           </a:p>
@@ -10138,7 +10296,7 @@
           <a:p>
             <a:fld id="{1CC94077-FDE3-401A-BCD8-35C08F9C8E9C}" type="datetime1">
               <a:rPr lang="en-US" smtClean="0"/>
-              <a:t>9/21/2015</a:t>
+              <a:t>9/25/2015</a:t>
             </a:fld>
             <a:endParaRPr lang="en-US"/>
           </a:p>
@@ -10556,7 +10714,7 @@
           <a:p>
             <a:fld id="{1CC94077-FDE3-401A-BCD8-35C08F9C8E9C}" type="datetime1">
               <a:rPr lang="en-US" smtClean="0"/>
-              <a:t>9/21/2015</a:t>
+              <a:t>9/25/2015</a:t>
             </a:fld>
             <a:endParaRPr lang="en-US"/>
           </a:p>
@@ -11016,7 +11174,7 @@
           <a:p>
             <a:fld id="{1CC94077-FDE3-401A-BCD8-35C08F9C8E9C}" type="datetime1">
               <a:rPr lang="en-US" smtClean="0"/>
-              <a:t>9/21/2015</a:t>
+              <a:t>9/25/2015</a:t>
             </a:fld>
             <a:endParaRPr lang="en-US"/>
           </a:p>
@@ -11484,7 +11642,7 @@
           <a:p>
             <a:fld id="{1CC94077-FDE3-401A-BCD8-35C08F9C8E9C}" type="datetime1">
               <a:rPr lang="en-US" smtClean="0"/>
-              <a:t>9/21/2015</a:t>
+              <a:t>9/25/2015</a:t>
             </a:fld>
             <a:endParaRPr lang="en-US"/>
           </a:p>
@@ -11702,7 +11860,7 @@
           <a:p>
             <a:fld id="{B8B20B94-8863-4C11-BD5B-99AFE2590A93}" type="datetime1">
               <a:rPr lang="en-US" smtClean="0"/>
-              <a:t>9/21/2015</a:t>
+              <a:t>9/25/2015</a:t>
             </a:fld>
             <a:endParaRPr lang="en-US"/>
           </a:p>
@@ -12340,7 +12498,7 @@
           <a:p>
             <a:fld id="{1CC94077-FDE3-401A-BCD8-35C08F9C8E9C}" type="datetime1">
               <a:rPr lang="en-US" smtClean="0"/>
-              <a:t>9/21/2015</a:t>
+              <a:t>9/25/2015</a:t>
             </a:fld>
             <a:endParaRPr lang="en-US"/>
           </a:p>
@@ -12545,7 +12703,7 @@
           <a:p>
             <a:fld id="{1CC94077-FDE3-401A-BCD8-35C08F9C8E9C}" type="datetime1">
               <a:rPr lang="en-US" smtClean="0"/>
-              <a:t>9/21/2015</a:t>
+              <a:t>9/25/2015</a:t>
             </a:fld>
             <a:endParaRPr lang="en-US"/>
           </a:p>
@@ -12819,7 +12977,7 @@
           <a:p>
             <a:fld id="{1CC94077-FDE3-401A-BCD8-35C08F9C8E9C}" type="datetime1">
               <a:rPr lang="en-US" smtClean="0"/>
-              <a:t>9/21/2015</a:t>
+              <a:t>9/25/2015</a:t>
             </a:fld>
             <a:endParaRPr lang="en-US"/>
           </a:p>
@@ -13093,7 +13251,7 @@
           <a:p>
             <a:fld id="{1CC94077-FDE3-401A-BCD8-35C08F9C8E9C}" type="datetime1">
               <a:rPr lang="en-US" smtClean="0"/>
-              <a:t>9/21/2015</a:t>
+              <a:t>9/25/2015</a:t>
             </a:fld>
             <a:endParaRPr lang="en-US"/>
           </a:p>
@@ -13389,7 +13547,7 @@
           <a:p>
             <a:fld id="{1CC94077-FDE3-401A-BCD8-35C08F9C8E9C}" type="datetime1">
               <a:rPr lang="en-US" smtClean="0"/>
-              <a:t>9/21/2015</a:t>
+              <a:t>9/25/2015</a:t>
             </a:fld>
             <a:endParaRPr lang="en-US"/>
           </a:p>
@@ -13727,7 +13885,7 @@
           <a:p>
             <a:fld id="{1CC94077-FDE3-401A-BCD8-35C08F9C8E9C}" type="datetime1">
               <a:rPr lang="en-US" smtClean="0"/>
-              <a:t>9/21/2015</a:t>
+              <a:t>9/25/2015</a:t>
             </a:fld>
             <a:endParaRPr lang="en-US"/>
           </a:p>
@@ -13961,7 +14119,7 @@
           <a:p>
             <a:fld id="{1CC94077-FDE3-401A-BCD8-35C08F9C8E9C}" type="datetime1">
               <a:rPr lang="en-US" smtClean="0"/>
-              <a:t>9/21/2015</a:t>
+              <a:t>9/25/2015</a:t>
             </a:fld>
             <a:endParaRPr lang="en-US"/>
           </a:p>
@@ -14250,7 +14408,7 @@
           <a:p>
             <a:fld id="{1CC94077-FDE3-401A-BCD8-35C08F9C8E9C}" type="datetime1">
               <a:rPr lang="en-US" smtClean="0"/>
-              <a:t>9/21/2015</a:t>
+              <a:t>9/25/2015</a:t>
             </a:fld>
             <a:endParaRPr lang="en-US"/>
           </a:p>
@@ -14607,7 +14765,7 @@
           <a:p>
             <a:fld id="{1CC94077-FDE3-401A-BCD8-35C08F9C8E9C}" type="datetime1">
               <a:rPr lang="en-US" smtClean="0"/>
-              <a:t>9/21/2015</a:t>
+              <a:t>9/25/2015</a:t>
             </a:fld>
             <a:endParaRPr lang="en-US"/>
           </a:p>
@@ -14895,7 +15053,7 @@
           <a:p>
             <a:fld id="{1CC94077-FDE3-401A-BCD8-35C08F9C8E9C}" type="datetime1">
               <a:rPr lang="en-US" smtClean="0"/>
-              <a:t>9/21/2015</a:t>
+              <a:t>9/25/2015</a:t>
             </a:fld>
             <a:endParaRPr lang="en-US"/>
           </a:p>
@@ -15099,7 +15257,7 @@
           <a:p>
             <a:fld id="{B8B20B94-8863-4C11-BD5B-99AFE2590A93}" type="datetime1">
               <a:rPr lang="en-US" smtClean="0"/>
-              <a:t>9/21/2015</a:t>
+              <a:t>9/25/2015</a:t>
             </a:fld>
             <a:endParaRPr lang="en-US"/>
           </a:p>
@@ -15673,7 +15831,7 @@
           <a:p>
             <a:fld id="{E945FFF6-7B56-4A06-A3D0-DFA9EB3EBC1D}" type="datetime1">
               <a:rPr lang="en-US" smtClean="0"/>
-              <a:t>9/21/2015</a:t>
+              <a:t>9/25/2015</a:t>
             </a:fld>
             <a:endParaRPr lang="en-US"/>
           </a:p>
@@ -15918,7 +16076,7 @@
           <a:p>
             <a:fld id="{CE778B27-C4F3-4FD3-A6BB-1E8866B655A8}" type="datetime1">
               <a:rPr lang="en-US" smtClean="0"/>
-              <a:t>9/21/2015</a:t>
+              <a:t>9/25/2015</a:t>
             </a:fld>
             <a:endParaRPr lang="en-US"/>
           </a:p>
@@ -16921,7 +17079,7 @@
           <a:p>
             <a:fld id="{6B9B7572-2EDC-4669-B3CE-54BED61294D5}" type="datetime1">
               <a:rPr lang="en-US" smtClean="0"/>
-              <a:t>9/21/2015</a:t>
+              <a:t>9/25/2015</a:t>
             </a:fld>
             <a:endParaRPr lang="en-US"/>
           </a:p>
@@ -17433,7 +17591,7 @@
           <a:p>
             <a:fld id="{95E3B975-9400-45B6-B8DD-72FA0247083D}" type="datetime1">
               <a:rPr lang="en-US" smtClean="0"/>
-              <a:t>9/21/2015</a:t>
+              <a:t>9/25/2015</a:t>
             </a:fld>
             <a:endParaRPr lang="en-US"/>
           </a:p>
@@ -17650,7 +17808,7 @@
           <a:p>
             <a:fld id="{11009266-8731-4561-A05C-81C9673AD39F}" type="datetime1">
               <a:rPr lang="en-US" smtClean="0"/>
-              <a:t>9/21/2015</a:t>
+              <a:t>9/25/2015</a:t>
             </a:fld>
             <a:endParaRPr lang="en-US"/>
           </a:p>
@@ -18267,4 +18425,289 @@
   <a:objectDefaults/>
   <a:extraClrSchemeLst/>
 </a:theme>
+</file>
+
+<file path=ppt/theme/theme3.xml><?xml version="1.0" encoding="utf-8"?>
+<a:theme xmlns:a="http://schemas.openxmlformats.org/drawingml/2006/main" name="Office Theme">
+  <a:themeElements>
+    <a:clrScheme name="Office">
+      <a:dk1>
+        <a:sysClr val="windowText" lastClr="000000"/>
+      </a:dk1>
+      <a:lt1>
+        <a:sysClr val="window" lastClr="FFFFFF"/>
+      </a:lt1>
+      <a:dk2>
+        <a:srgbClr val="1F497D"/>
+      </a:dk2>
+      <a:lt2>
+        <a:srgbClr val="EEECE1"/>
+      </a:lt2>
+      <a:accent1>
+        <a:srgbClr val="4F81BD"/>
+      </a:accent1>
+      <a:accent2>
+        <a:srgbClr val="C0504D"/>
+      </a:accent2>
+      <a:accent3>
+        <a:srgbClr val="9BBB59"/>
+      </a:accent3>
+      <a:accent4>
+        <a:srgbClr val="8064A2"/>
+      </a:accent4>
+      <a:accent5>
+        <a:srgbClr val="4BACC6"/>
+      </a:accent5>
+      <a:accent6>
+        <a:srgbClr val="F79646"/>
+      </a:accent6>
+      <a:hlink>
+        <a:srgbClr val="0000FF"/>
+      </a:hlink>
+      <a:folHlink>
+        <a:srgbClr val="800080"/>
+      </a:folHlink>
+    </a:clrScheme>
+    <a:fontScheme name="Office">
+      <a:majorFont>
+        <a:latin typeface="Calibri"/>
+        <a:ea typeface=""/>
+        <a:cs typeface=""/>
+        <a:font script="Jpan" typeface="ＭＳ Ｐゴシック"/>
+        <a:font script="Hang" typeface="맑은 고딕"/>
+        <a:font script="Hans" typeface="宋体"/>
+        <a:font script="Hant" typeface="新細明體"/>
+        <a:font script="Arab" typeface="Times New Roman"/>
+        <a:font script="Hebr" typeface="Times New Roman"/>
+        <a:font script="Thai" typeface="Angsana New"/>
+        <a:font script="Ethi" typeface="Nyala"/>
+        <a:font script="Beng" typeface="Vrinda"/>
+        <a:font script="Gujr" typeface="Shruti"/>
+        <a:font script="Khmr" typeface="MoolBoran"/>
+        <a:font script="Knda" typeface="Tunga"/>
+        <a:font script="Guru" typeface="Raavi"/>
+        <a:font script="Cans" typeface="Euphemia"/>
+        <a:font script="Cher" typeface="Plantagenet Cherokee"/>
+        <a:font script="Yiii" typeface="Microsoft Yi Baiti"/>
+        <a:font script="Tibt" typeface="Microsoft Himalaya"/>
+        <a:font script="Thaa" typeface="MV Boli"/>
+        <a:font script="Deva" typeface="Mangal"/>
+        <a:font script="Telu" typeface="Gautami"/>
+        <a:font script="Taml" typeface="Latha"/>
+        <a:font script="Syrc" typeface="Estrangelo Edessa"/>
+        <a:font script="Orya" typeface="Kalinga"/>
+        <a:font script="Mlym" typeface="Kartika"/>
+        <a:font script="Laoo" typeface="DokChampa"/>
+        <a:font script="Sinh" typeface="Iskoola Pota"/>
+        <a:font script="Mong" typeface="Mongolian Baiti"/>
+        <a:font script="Viet" typeface="Times New Roman"/>
+        <a:font script="Uigh" typeface="Microsoft Uighur"/>
+        <a:font script="Geor" typeface="Sylfaen"/>
+      </a:majorFont>
+      <a:minorFont>
+        <a:latin typeface="Calibri"/>
+        <a:ea typeface=""/>
+        <a:cs typeface=""/>
+        <a:font script="Jpan" typeface="ＭＳ Ｐゴシック"/>
+        <a:font script="Hang" typeface="맑은 고딕"/>
+        <a:font script="Hans" typeface="宋体"/>
+        <a:font script="Hant" typeface="新細明體"/>
+        <a:font script="Arab" typeface="Arial"/>
+        <a:font script="Hebr" typeface="Arial"/>
+        <a:font script="Thai" typeface="Cordia New"/>
+        <a:font script="Ethi" typeface="Nyala"/>
+        <a:font script="Beng" typeface="Vrinda"/>
+        <a:font script="Gujr" typeface="Shruti"/>
+        <a:font script="Khmr" typeface="DaunPenh"/>
+        <a:font script="Knda" typeface="Tunga"/>
+        <a:font script="Guru" typeface="Raavi"/>
+        <a:font script="Cans" typeface="Euphemia"/>
+        <a:font script="Cher" typeface="Plantagenet Cherokee"/>
+        <a:font script="Yiii" typeface="Microsoft Yi Baiti"/>
+        <a:font script="Tibt" typeface="Microsoft Himalaya"/>
+        <a:font script="Thaa" typeface="MV Boli"/>
+        <a:font script="Deva" typeface="Mangal"/>
+        <a:font script="Telu" typeface="Gautami"/>
+        <a:font script="Taml" typeface="Latha"/>
+        <a:font script="Syrc" typeface="Estrangelo Edessa"/>
+        <a:font script="Orya" typeface="Kalinga"/>
+        <a:font script="Mlym" typeface="Kartika"/>
+        <a:font script="Laoo" typeface="DokChampa"/>
+        <a:font script="Sinh" typeface="Iskoola Pota"/>
+        <a:font script="Mong" typeface="Mongolian Baiti"/>
+        <a:font script="Viet" typeface="Arial"/>
+        <a:font script="Uigh" typeface="Microsoft Uighur"/>
+        <a:font script="Geor" typeface="Sylfaen"/>
+      </a:minorFont>
+    </a:fontScheme>
+    <a:fmtScheme name="Office">
+      <a:fillStyleLst>
+        <a:solidFill>
+          <a:schemeClr val="phClr"/>
+        </a:solidFill>
+        <a:gradFill rotWithShape="1">
+          <a:gsLst>
+            <a:gs pos="0">
+              <a:schemeClr val="phClr">
+                <a:tint val="50000"/>
+                <a:satMod val="300000"/>
+              </a:schemeClr>
+            </a:gs>
+            <a:gs pos="35000">
+              <a:schemeClr val="phClr">
+                <a:tint val="37000"/>
+                <a:satMod val="300000"/>
+              </a:schemeClr>
+            </a:gs>
+            <a:gs pos="100000">
+              <a:schemeClr val="phClr">
+                <a:tint val="15000"/>
+                <a:satMod val="350000"/>
+              </a:schemeClr>
+            </a:gs>
+          </a:gsLst>
+          <a:lin ang="16200000" scaled="1"/>
+        </a:gradFill>
+        <a:gradFill rotWithShape="1">
+          <a:gsLst>
+            <a:gs pos="0">
+              <a:schemeClr val="phClr">
+                <a:shade val="51000"/>
+                <a:satMod val="130000"/>
+              </a:schemeClr>
+            </a:gs>
+            <a:gs pos="80000">
+              <a:schemeClr val="phClr">
+                <a:shade val="93000"/>
+                <a:satMod val="130000"/>
+              </a:schemeClr>
+            </a:gs>
+            <a:gs pos="100000">
+              <a:schemeClr val="phClr">
+                <a:shade val="94000"/>
+                <a:satMod val="135000"/>
+              </a:schemeClr>
+            </a:gs>
+          </a:gsLst>
+          <a:lin ang="16200000" scaled="0"/>
+        </a:gradFill>
+      </a:fillStyleLst>
+      <a:lnStyleLst>
+        <a:ln w="9525" cap="flat" cmpd="sng" algn="ctr">
+          <a:solidFill>
+            <a:schemeClr val="phClr">
+              <a:shade val="95000"/>
+              <a:satMod val="105000"/>
+            </a:schemeClr>
+          </a:solidFill>
+          <a:prstDash val="solid"/>
+        </a:ln>
+        <a:ln w="25400" cap="flat" cmpd="sng" algn="ctr">
+          <a:solidFill>
+            <a:schemeClr val="phClr"/>
+          </a:solidFill>
+          <a:prstDash val="solid"/>
+        </a:ln>
+        <a:ln w="38100" cap="flat" cmpd="sng" algn="ctr">
+          <a:solidFill>
+            <a:schemeClr val="phClr"/>
+          </a:solidFill>
+          <a:prstDash val="solid"/>
+        </a:ln>
+      </a:lnStyleLst>
+      <a:effectStyleLst>
+        <a:effectStyle>
+          <a:effectLst>
+            <a:outerShdw blurRad="40000" dist="20000" dir="5400000" rotWithShape="0">
+              <a:srgbClr val="000000">
+                <a:alpha val="38000"/>
+              </a:srgbClr>
+            </a:outerShdw>
+          </a:effectLst>
+        </a:effectStyle>
+        <a:effectStyle>
+          <a:effectLst>
+            <a:outerShdw blurRad="40000" dist="23000" dir="5400000" rotWithShape="0">
+              <a:srgbClr val="000000">
+                <a:alpha val="35000"/>
+              </a:srgbClr>
+            </a:outerShdw>
+          </a:effectLst>
+        </a:effectStyle>
+        <a:effectStyle>
+          <a:effectLst>
+            <a:outerShdw blurRad="40000" dist="23000" dir="5400000" rotWithShape="0">
+              <a:srgbClr val="000000">
+                <a:alpha val="35000"/>
+              </a:srgbClr>
+            </a:outerShdw>
+          </a:effectLst>
+          <a:scene3d>
+            <a:camera prst="orthographicFront">
+              <a:rot lat="0" lon="0" rev="0"/>
+            </a:camera>
+            <a:lightRig rig="threePt" dir="t">
+              <a:rot lat="0" lon="0" rev="1200000"/>
+            </a:lightRig>
+          </a:scene3d>
+          <a:sp3d>
+            <a:bevelT w="63500" h="25400"/>
+          </a:sp3d>
+        </a:effectStyle>
+      </a:effectStyleLst>
+      <a:bgFillStyleLst>
+        <a:solidFill>
+          <a:schemeClr val="phClr"/>
+        </a:solidFill>
+        <a:gradFill rotWithShape="1">
+          <a:gsLst>
+            <a:gs pos="0">
+              <a:schemeClr val="phClr">
+                <a:tint val="40000"/>
+                <a:satMod val="350000"/>
+              </a:schemeClr>
+            </a:gs>
+            <a:gs pos="40000">
+              <a:schemeClr val="phClr">
+                <a:tint val="45000"/>
+                <a:shade val="99000"/>
+                <a:satMod val="350000"/>
+              </a:schemeClr>
+            </a:gs>
+            <a:gs pos="100000">
+              <a:schemeClr val="phClr">
+                <a:shade val="20000"/>
+                <a:satMod val="255000"/>
+              </a:schemeClr>
+            </a:gs>
+          </a:gsLst>
+          <a:path path="circle">
+            <a:fillToRect l="50000" t="-80000" r="50000" b="180000"/>
+          </a:path>
+        </a:gradFill>
+        <a:gradFill rotWithShape="1">
+          <a:gsLst>
+            <a:gs pos="0">
+              <a:schemeClr val="phClr">
+                <a:tint val="80000"/>
+                <a:satMod val="300000"/>
+              </a:schemeClr>
+            </a:gs>
+            <a:gs pos="100000">
+              <a:schemeClr val="phClr">
+                <a:shade val="30000"/>
+                <a:satMod val="200000"/>
+              </a:schemeClr>
+            </a:gs>
+          </a:gsLst>
+          <a:path path="circle">
+            <a:fillToRect l="50000" t="50000" r="50000" b="50000"/>
+          </a:path>
+        </a:gradFill>
+      </a:bgFillStyleLst>
+    </a:fmtScheme>
+  </a:themeElements>
+  <a:objectDefaults/>
+  <a:extraClrSchemeLst/>
+</a:theme>
 </file>
</xml_diff>